<commit_message>
only relavant logs are shown
</commit_message>
<xml_diff>
--- a/doc/plan/version 2.pptx
+++ b/doc/plan/version 2.pptx
@@ -7,13 +7,14 @@
   <p:sldIdLst>
     <p:sldId id="261" r:id="rId2"/>
     <p:sldId id="262" r:id="rId3"/>
-    <p:sldId id="257" r:id="rId4"/>
-    <p:sldId id="258" r:id="rId5"/>
-    <p:sldId id="259" r:id="rId6"/>
-    <p:sldId id="263" r:id="rId7"/>
-    <p:sldId id="266" r:id="rId8"/>
-    <p:sldId id="264" r:id="rId9"/>
-    <p:sldId id="265" r:id="rId10"/>
+    <p:sldId id="267" r:id="rId4"/>
+    <p:sldId id="257" r:id="rId5"/>
+    <p:sldId id="258" r:id="rId6"/>
+    <p:sldId id="259" r:id="rId7"/>
+    <p:sldId id="263" r:id="rId8"/>
+    <p:sldId id="266" r:id="rId9"/>
+    <p:sldId id="264" r:id="rId10"/>
+    <p:sldId id="265" r:id="rId11"/>
   </p:sldIdLst>
   <p:sldSz cx="6732588" cy="10115550"/>
   <p:notesSz cx="6858000" cy="9144000"/>
@@ -174,7 +175,7 @@
               <a:cs typeface="+mn-cs"/>
             </a:defRPr>
           </a:pPr>
-          <a:endParaRPr lang="ko-KR"/>
+          <a:endParaRPr lang="en-US"/>
         </a:p>
       </c:txPr>
     </c:title>
@@ -201,7 +202,7 @@
           <c:spPr>
             <a:ln w="28575" cap="rnd">
               <a:solidFill>
-                <a:srgbClr val="952613"/>
+                <a:schemeClr val="accent1"/>
               </a:solidFill>
               <a:round/>
             </a:ln>
@@ -311,7 +312,7 @@
                 <a:cs typeface="+mn-cs"/>
               </a:defRPr>
             </a:pPr>
-            <a:endParaRPr lang="ko-KR"/>
+            <a:endParaRPr lang="en-US"/>
           </a:p>
         </c:txPr>
         <c:crossAx val="1184009216"/>
@@ -370,7 +371,7 @@
                 <a:cs typeface="+mn-cs"/>
               </a:defRPr>
             </a:pPr>
-            <a:endParaRPr lang="ko-KR"/>
+            <a:endParaRPr lang="en-US"/>
           </a:p>
         </c:txPr>
         <c:crossAx val="1190624032"/>
@@ -410,7 +411,7 @@
       <a:pPr>
         <a:defRPr/>
       </a:pPr>
-      <a:endParaRPr lang="ko-KR"/>
+      <a:endParaRPr lang="en-US"/>
     </a:p>
   </c:txPr>
   <c:externalData r:id="rId3">
@@ -459,7 +460,7 @@
               <a:cs typeface="+mn-cs"/>
             </a:defRPr>
           </a:pPr>
-          <a:endParaRPr lang="ko-KR"/>
+          <a:endParaRPr lang="en-US"/>
         </a:p>
       </c:txPr>
     </c:title>
@@ -486,7 +487,7 @@
           <c:spPr>
             <a:ln w="28575" cap="rnd">
               <a:solidFill>
-                <a:srgbClr val="952613"/>
+                <a:schemeClr val="accent1"/>
               </a:solidFill>
               <a:round/>
             </a:ln>
@@ -596,7 +597,7 @@
                 <a:cs typeface="+mn-cs"/>
               </a:defRPr>
             </a:pPr>
-            <a:endParaRPr lang="ko-KR"/>
+            <a:endParaRPr lang="en-US"/>
           </a:p>
         </c:txPr>
         <c:crossAx val="1184009216"/>
@@ -655,7 +656,7 @@
                 <a:cs typeface="+mn-cs"/>
               </a:defRPr>
             </a:pPr>
-            <a:endParaRPr lang="ko-KR"/>
+            <a:endParaRPr lang="en-US"/>
           </a:p>
         </c:txPr>
         <c:crossAx val="1190624032"/>
@@ -695,7 +696,7 @@
       <a:pPr>
         <a:defRPr/>
       </a:pPr>
-      <a:endParaRPr lang="ko-KR"/>
+      <a:endParaRPr lang="en-US"/>
     </a:p>
   </c:txPr>
   <c:externalData r:id="rId3">
@@ -2136,6 +2137,92 @@
 </p188:cmLst>
 </file>
 
+<file path=ppt/comments/modernComment_10B_FF5EC33D.xml><?xml version="1.0" encoding="utf-8"?>
+<p188:cmLst xmlns:a="http://schemas.openxmlformats.org/drawingml/2006/main" xmlns:r="http://schemas.openxmlformats.org/officeDocument/2006/relationships" xmlns:p188="http://schemas.microsoft.com/office/powerpoint/2018/8/main">
+  <p188:cm id="{C0236069-C774-47E0-A118-ACED4813BA9E}" authorId="{7C2E7579-0009-95B3-8778-C60A511AA04A}" created="2024-02-29T19:42:17.506">
+    <pc:sldMkLst xmlns:pc="http://schemas.microsoft.com/office/powerpoint/2013/main/command">
+      <pc:docMk/>
+      <pc:sldMk cId="326648802" sldId="256"/>
+    </pc:sldMkLst>
+    <p188:txBody>
+      <a:bodyPr/>
+      <a:lstStyle/>
+      <a:p>
+        <a:r>
+          <a:rPr lang="ko-KR" altLang="en-US"/>
+          <a:t>Reset button (for filter)</a:t>
+        </a:r>
+      </a:p>
+    </p188:txBody>
+  </p188:cm>
+  <p188:cm id="{2A317266-0FDE-4F04-9E57-6820DF8EC71C}" authorId="{7C2E7579-0009-95B3-8778-C60A511AA04A}" created="2024-02-29T19:43:01.284">
+    <pc:sldMkLst xmlns:pc="http://schemas.microsoft.com/office/powerpoint/2013/main/command">
+      <pc:docMk/>
+      <pc:sldMk cId="326648802" sldId="256"/>
+    </pc:sldMkLst>
+    <p188:txBody>
+      <a:bodyPr/>
+      <a:lstStyle/>
+      <a:p>
+        <a:r>
+          <a:rPr lang="ko-KR" altLang="en-US"/>
+          <a:t>Past log</a:t>
+        </a:r>
+      </a:p>
+    </p188:txBody>
+  </p188:cm>
+  <p188:cm id="{E343FF49-04F8-4493-B81C-AD50AAF14637}" authorId="{7C2E7579-0009-95B3-8778-C60A511AA04A}" created="2024-02-29T19:43:09.447">
+    <pc:sldMkLst xmlns:pc="http://schemas.microsoft.com/office/powerpoint/2013/main/command">
+      <pc:docMk/>
+      <pc:sldMk cId="326648802" sldId="256"/>
+    </pc:sldMkLst>
+    <p188:txBody>
+      <a:bodyPr/>
+      <a:lstStyle/>
+      <a:p>
+        <a:r>
+          <a:rPr lang="ko-KR" altLang="en-US"/>
+          <a:t>Graph</a:t>
+        </a:r>
+      </a:p>
+    </p188:txBody>
+  </p188:cm>
+  <p188:cm id="{E3F966B1-9FBC-4777-B50C-35F2BB13AACF}" authorId="{7C2E7579-0009-95B3-8778-C60A511AA04A}" created="2024-02-29T22:54:04.071">
+    <pc:sldMkLst xmlns:pc="http://schemas.microsoft.com/office/powerpoint/2013/main/command">
+      <pc:docMk/>
+      <pc:sldMk cId="2286257811" sldId="261"/>
+    </pc:sldMkLst>
+    <p188:txBody>
+      <a:bodyPr/>
+      <a:lstStyle/>
+      <a:p>
+        <a:r>
+          <a:rPr lang="ko-KR" altLang="en-US"/>
+          <a:t>Track if user recorded the first set as the warming up set
+</a:t>
+        </a:r>
+      </a:p>
+    </p188:txBody>
+  </p188:cm>
+  <p188:cm id="{ED7AACCC-195A-4677-9961-AA1493073BE4}" authorId="{7C2E7579-0009-95B3-8778-C60A511AA04A}" created="2024-03-01T04:47:37.157">
+    <pc:sldMkLst xmlns:pc="http://schemas.microsoft.com/office/powerpoint/2013/main/command">
+      <pc:docMk/>
+      <pc:sldMk cId="1443124297" sldId="262"/>
+    </pc:sldMkLst>
+    <p188:txBody>
+      <a:bodyPr/>
+      <a:lstStyle/>
+      <a:p>
+        <a:r>
+          <a:rPr lang="ko-KR" altLang="en-US"/>
+          <a:t>The tag used last, when was the last time used, what tag contains recommended exercise</a:t>
+        </a:r>
+      </a:p>
+    </p188:txBody>
+  </p188:cm>
+</p188:cmLst>
+</file>
+
 <file path=ppt/slideLayouts/slideLayout1.xml><?xml version="1.0" encoding="utf-8"?>
 <p:sldLayout xmlns:a="http://schemas.openxmlformats.org/drawingml/2006/main" xmlns:r="http://schemas.openxmlformats.org/officeDocument/2006/relationships" xmlns:p="http://schemas.openxmlformats.org/presentationml/2006/main" type="title" preserve="1">
   <p:cSld name="Title Slide">
@@ -2267,7 +2354,7 @@
           <a:p>
             <a:fld id="{1B6A1EFB-6C8C-4EE3-8FA3-17FA44E47B74}" type="datetimeFigureOut">
               <a:rPr lang="ko-KR" altLang="en-US" smtClean="0"/>
-              <a:t>2024-03-07</a:t>
+              <a:t>2024-03-12</a:t>
             </a:fld>
             <a:endParaRPr lang="ko-KR" altLang="en-US"/>
           </a:p>
@@ -2437,7 +2524,7 @@
           <a:p>
             <a:fld id="{1B6A1EFB-6C8C-4EE3-8FA3-17FA44E47B74}" type="datetimeFigureOut">
               <a:rPr lang="ko-KR" altLang="en-US" smtClean="0"/>
-              <a:t>2024-03-07</a:t>
+              <a:t>2024-03-12</a:t>
             </a:fld>
             <a:endParaRPr lang="ko-KR" altLang="en-US"/>
           </a:p>
@@ -2617,7 +2704,7 @@
           <a:p>
             <a:fld id="{1B6A1EFB-6C8C-4EE3-8FA3-17FA44E47B74}" type="datetimeFigureOut">
               <a:rPr lang="ko-KR" altLang="en-US" smtClean="0"/>
-              <a:t>2024-03-07</a:t>
+              <a:t>2024-03-12</a:t>
             </a:fld>
             <a:endParaRPr lang="ko-KR" altLang="en-US"/>
           </a:p>
@@ -2787,7 +2874,7 @@
           <a:p>
             <a:fld id="{1B6A1EFB-6C8C-4EE3-8FA3-17FA44E47B74}" type="datetimeFigureOut">
               <a:rPr lang="ko-KR" altLang="en-US" smtClean="0"/>
-              <a:t>2024-03-07</a:t>
+              <a:t>2024-03-12</a:t>
             </a:fld>
             <a:endParaRPr lang="ko-KR" altLang="en-US"/>
           </a:p>
@@ -3031,7 +3118,7 @@
           <a:p>
             <a:fld id="{1B6A1EFB-6C8C-4EE3-8FA3-17FA44E47B74}" type="datetimeFigureOut">
               <a:rPr lang="ko-KR" altLang="en-US" smtClean="0"/>
-              <a:t>2024-03-07</a:t>
+              <a:t>2024-03-12</a:t>
             </a:fld>
             <a:endParaRPr lang="ko-KR" altLang="en-US"/>
           </a:p>
@@ -3263,7 +3350,7 @@
           <a:p>
             <a:fld id="{1B6A1EFB-6C8C-4EE3-8FA3-17FA44E47B74}" type="datetimeFigureOut">
               <a:rPr lang="ko-KR" altLang="en-US" smtClean="0"/>
-              <a:t>2024-03-07</a:t>
+              <a:t>2024-03-12</a:t>
             </a:fld>
             <a:endParaRPr lang="ko-KR" altLang="en-US"/>
           </a:p>
@@ -3630,7 +3717,7 @@
           <a:p>
             <a:fld id="{1B6A1EFB-6C8C-4EE3-8FA3-17FA44E47B74}" type="datetimeFigureOut">
               <a:rPr lang="ko-KR" altLang="en-US" smtClean="0"/>
-              <a:t>2024-03-07</a:t>
+              <a:t>2024-03-12</a:t>
             </a:fld>
             <a:endParaRPr lang="ko-KR" altLang="en-US"/>
           </a:p>
@@ -3748,7 +3835,7 @@
           <a:p>
             <a:fld id="{1B6A1EFB-6C8C-4EE3-8FA3-17FA44E47B74}" type="datetimeFigureOut">
               <a:rPr lang="ko-KR" altLang="en-US" smtClean="0"/>
-              <a:t>2024-03-07</a:t>
+              <a:t>2024-03-12</a:t>
             </a:fld>
             <a:endParaRPr lang="ko-KR" altLang="en-US"/>
           </a:p>
@@ -3843,7 +3930,7 @@
           <a:p>
             <a:fld id="{1B6A1EFB-6C8C-4EE3-8FA3-17FA44E47B74}" type="datetimeFigureOut">
               <a:rPr lang="ko-KR" altLang="en-US" smtClean="0"/>
-              <a:t>2024-03-07</a:t>
+              <a:t>2024-03-12</a:t>
             </a:fld>
             <a:endParaRPr lang="ko-KR" altLang="en-US"/>
           </a:p>
@@ -4120,7 +4207,7 @@
           <a:p>
             <a:fld id="{1B6A1EFB-6C8C-4EE3-8FA3-17FA44E47B74}" type="datetimeFigureOut">
               <a:rPr lang="ko-KR" altLang="en-US" smtClean="0"/>
-              <a:t>2024-03-07</a:t>
+              <a:t>2024-03-12</a:t>
             </a:fld>
             <a:endParaRPr lang="ko-KR" altLang="en-US"/>
           </a:p>
@@ -4377,7 +4464,7 @@
           <a:p>
             <a:fld id="{1B6A1EFB-6C8C-4EE3-8FA3-17FA44E47B74}" type="datetimeFigureOut">
               <a:rPr lang="ko-KR" altLang="en-US" smtClean="0"/>
-              <a:t>2024-03-07</a:t>
+              <a:t>2024-03-12</a:t>
             </a:fld>
             <a:endParaRPr lang="ko-KR" altLang="en-US"/>
           </a:p>
@@ -4590,7 +4677,7 @@
           <a:p>
             <a:fld id="{1B6A1EFB-6C8C-4EE3-8FA3-17FA44E47B74}" type="datetimeFigureOut">
               <a:rPr lang="ko-KR" altLang="en-US" smtClean="0"/>
-              <a:t>2024-03-07</a:t>
+              <a:t>2024-03-12</a:t>
             </a:fld>
             <a:endParaRPr lang="ko-KR" altLang="en-US"/>
           </a:p>
@@ -6740,6 +6827,367 @@
       <p188:commentRel xmlns:p188="http://schemas.microsoft.com/office/powerpoint/2018/8/main" r:id="rId2"/>
     </p:ext>
   </p:extLst>
+</p:sld>
+</file>
+
+<file path=ppt/slides/slide10.xml><?xml version="1.0" encoding="utf-8"?>
+<p:sld xmlns:a="http://schemas.openxmlformats.org/drawingml/2006/main" xmlns:r="http://schemas.openxmlformats.org/officeDocument/2006/relationships" xmlns:p="http://schemas.openxmlformats.org/presentationml/2006/main">
+  <p:cSld>
+    <p:spTree>
+      <p:nvGrpSpPr>
+        <p:cNvPr id="1" name=""/>
+        <p:cNvGrpSpPr/>
+        <p:nvPr/>
+      </p:nvGrpSpPr>
+      <p:grpSpPr>
+        <a:xfrm>
+          <a:off x="0" y="0"/>
+          <a:ext cx="0" cy="0"/>
+          <a:chOff x="0" y="0"/>
+          <a:chExt cx="0" cy="0"/>
+        </a:xfrm>
+      </p:grpSpPr>
+      <p:sp>
+        <p:nvSpPr>
+          <p:cNvPr id="4" name="Rectangle 3">
+            <a:extLst>
+              <a:ext uri="{FF2B5EF4-FFF2-40B4-BE49-F238E27FC236}">
+                <a16:creationId xmlns:a16="http://schemas.microsoft.com/office/drawing/2014/main" id="{7618E36C-9D8B-55D8-DCA1-B598E9C7E19F}"/>
+              </a:ext>
+            </a:extLst>
+          </p:cNvPr>
+          <p:cNvSpPr/>
+          <p:nvPr/>
+        </p:nvSpPr>
+        <p:spPr>
+          <a:xfrm>
+            <a:off x="0" y="9430602"/>
+            <a:ext cx="2174236" cy="684947"/>
+          </a:xfrm>
+          <a:prstGeom prst="rect">
+            <a:avLst/>
+          </a:prstGeom>
+          <a:noFill/>
+        </p:spPr>
+        <p:style>
+          <a:lnRef idx="2">
+            <a:schemeClr val="accent1">
+              <a:shade val="15000"/>
+            </a:schemeClr>
+          </a:lnRef>
+          <a:fillRef idx="1">
+            <a:schemeClr val="accent1"/>
+          </a:fillRef>
+          <a:effectRef idx="0">
+            <a:schemeClr val="accent1"/>
+          </a:effectRef>
+          <a:fontRef idx="minor">
+            <a:schemeClr val="lt1"/>
+          </a:fontRef>
+        </p:style>
+        <p:txBody>
+          <a:bodyPr rtlCol="0" anchor="ctr"/>
+          <a:lstStyle/>
+          <a:p>
+            <a:pPr algn="ctr"/>
+            <a:endParaRPr lang="ko-KR" altLang="en-US"/>
+          </a:p>
+        </p:txBody>
+      </p:sp>
+      <p:sp>
+        <p:nvSpPr>
+          <p:cNvPr id="5" name="Rectangle 4">
+            <a:extLst>
+              <a:ext uri="{FF2B5EF4-FFF2-40B4-BE49-F238E27FC236}">
+                <a16:creationId xmlns:a16="http://schemas.microsoft.com/office/drawing/2014/main" id="{9C3BA55D-E5F8-48B8-DAF6-24831D1EE7F4}"/>
+              </a:ext>
+            </a:extLst>
+          </p:cNvPr>
+          <p:cNvSpPr/>
+          <p:nvPr/>
+        </p:nvSpPr>
+        <p:spPr>
+          <a:xfrm>
+            <a:off x="2174236" y="9430602"/>
+            <a:ext cx="2384116" cy="684947"/>
+          </a:xfrm>
+          <a:prstGeom prst="rect">
+            <a:avLst/>
+          </a:prstGeom>
+          <a:noFill/>
+        </p:spPr>
+        <p:style>
+          <a:lnRef idx="2">
+            <a:schemeClr val="accent1">
+              <a:shade val="15000"/>
+            </a:schemeClr>
+          </a:lnRef>
+          <a:fillRef idx="1">
+            <a:schemeClr val="accent1"/>
+          </a:fillRef>
+          <a:effectRef idx="0">
+            <a:schemeClr val="accent1"/>
+          </a:effectRef>
+          <a:fontRef idx="minor">
+            <a:schemeClr val="lt1"/>
+          </a:fontRef>
+        </p:style>
+        <p:txBody>
+          <a:bodyPr rtlCol="0" anchor="ctr"/>
+          <a:lstStyle/>
+          <a:p>
+            <a:pPr algn="ctr"/>
+            <a:endParaRPr lang="ko-KR" altLang="en-US"/>
+          </a:p>
+        </p:txBody>
+      </p:sp>
+      <p:sp>
+        <p:nvSpPr>
+          <p:cNvPr id="6" name="Rectangle 5">
+            <a:extLst>
+              <a:ext uri="{FF2B5EF4-FFF2-40B4-BE49-F238E27FC236}">
+                <a16:creationId xmlns:a16="http://schemas.microsoft.com/office/drawing/2014/main" id="{7DE37287-A826-004C-4743-526EB9583781}"/>
+              </a:ext>
+            </a:extLst>
+          </p:cNvPr>
+          <p:cNvSpPr/>
+          <p:nvPr/>
+        </p:nvSpPr>
+        <p:spPr>
+          <a:xfrm>
+            <a:off x="4558352" y="9430602"/>
+            <a:ext cx="2174236" cy="684947"/>
+          </a:xfrm>
+          <a:prstGeom prst="rect">
+            <a:avLst/>
+          </a:prstGeom>
+          <a:noFill/>
+        </p:spPr>
+        <p:style>
+          <a:lnRef idx="2">
+            <a:schemeClr val="accent1">
+              <a:shade val="15000"/>
+            </a:schemeClr>
+          </a:lnRef>
+          <a:fillRef idx="1">
+            <a:schemeClr val="accent1"/>
+          </a:fillRef>
+          <a:effectRef idx="0">
+            <a:schemeClr val="accent1"/>
+          </a:effectRef>
+          <a:fontRef idx="minor">
+            <a:schemeClr val="lt1"/>
+          </a:fontRef>
+        </p:style>
+        <p:txBody>
+          <a:bodyPr rtlCol="0" anchor="ctr"/>
+          <a:lstStyle/>
+          <a:p>
+            <a:pPr algn="ctr"/>
+            <a:endParaRPr lang="ko-KR" altLang="en-US"/>
+          </a:p>
+        </p:txBody>
+      </p:sp>
+      <p:sp>
+        <p:nvSpPr>
+          <p:cNvPr id="7" name="Rectangle 6">
+            <a:extLst>
+              <a:ext uri="{FF2B5EF4-FFF2-40B4-BE49-F238E27FC236}">
+                <a16:creationId xmlns:a16="http://schemas.microsoft.com/office/drawing/2014/main" id="{63023936-5EB5-6DCB-C43D-D3CFC72FC7A1}"/>
+              </a:ext>
+            </a:extLst>
+          </p:cNvPr>
+          <p:cNvSpPr/>
+          <p:nvPr/>
+        </p:nvSpPr>
+        <p:spPr>
+          <a:xfrm>
+            <a:off x="0" y="0"/>
+            <a:ext cx="6732588" cy="586854"/>
+          </a:xfrm>
+          <a:prstGeom prst="rect">
+            <a:avLst/>
+          </a:prstGeom>
+          <a:noFill/>
+        </p:spPr>
+        <p:style>
+          <a:lnRef idx="2">
+            <a:schemeClr val="accent1">
+              <a:shade val="15000"/>
+            </a:schemeClr>
+          </a:lnRef>
+          <a:fillRef idx="1">
+            <a:schemeClr val="accent1"/>
+          </a:fillRef>
+          <a:effectRef idx="0">
+            <a:schemeClr val="accent1"/>
+          </a:effectRef>
+          <a:fontRef idx="minor">
+            <a:schemeClr val="lt1"/>
+          </a:fontRef>
+        </p:style>
+        <p:txBody>
+          <a:bodyPr rtlCol="0" anchor="ctr"/>
+          <a:lstStyle/>
+          <a:p>
+            <a:pPr algn="ctr"/>
+            <a:endParaRPr lang="ko-KR" altLang="en-US" dirty="0"/>
+          </a:p>
+        </p:txBody>
+      </p:sp>
+      <p:sp>
+        <p:nvSpPr>
+          <p:cNvPr id="8" name="TextBox 7">
+            <a:extLst>
+              <a:ext uri="{FF2B5EF4-FFF2-40B4-BE49-F238E27FC236}">
+                <a16:creationId xmlns:a16="http://schemas.microsoft.com/office/drawing/2014/main" id="{3AB4BDF4-175C-7077-9C6D-B9E1CBB1D426}"/>
+              </a:ext>
+            </a:extLst>
+          </p:cNvPr>
+          <p:cNvSpPr txBox="1"/>
+          <p:nvPr/>
+        </p:nvSpPr>
+        <p:spPr>
+          <a:xfrm>
+            <a:off x="154367" y="115165"/>
+            <a:ext cx="2174236" cy="646331"/>
+          </a:xfrm>
+          <a:prstGeom prst="rect">
+            <a:avLst/>
+          </a:prstGeom>
+          <a:noFill/>
+        </p:spPr>
+        <p:txBody>
+          <a:bodyPr wrap="square" rtlCol="0">
+            <a:spAutoFit/>
+          </a:bodyPr>
+          <a:lstStyle/>
+          <a:p>
+            <a:r>
+              <a:rPr lang="en-US" altLang="ko-KR" dirty="0"/>
+              <a:t>&lt; Privacy Policy</a:t>
+            </a:r>
+          </a:p>
+          <a:p>
+            <a:endParaRPr lang="en-US" altLang="ko-KR" dirty="0"/>
+          </a:p>
+        </p:txBody>
+      </p:sp>
+      <p:sp>
+        <p:nvSpPr>
+          <p:cNvPr id="9" name="TextBox 8">
+            <a:extLst>
+              <a:ext uri="{FF2B5EF4-FFF2-40B4-BE49-F238E27FC236}">
+                <a16:creationId xmlns:a16="http://schemas.microsoft.com/office/drawing/2014/main" id="{D997270B-E683-B546-3A16-669298B7E848}"/>
+              </a:ext>
+            </a:extLst>
+          </p:cNvPr>
+          <p:cNvSpPr txBox="1"/>
+          <p:nvPr/>
+        </p:nvSpPr>
+        <p:spPr>
+          <a:xfrm>
+            <a:off x="709684" y="9630619"/>
+            <a:ext cx="750526" cy="369332"/>
+          </a:xfrm>
+          <a:prstGeom prst="rect">
+            <a:avLst/>
+          </a:prstGeom>
+          <a:noFill/>
+        </p:spPr>
+        <p:txBody>
+          <a:bodyPr wrap="none" rtlCol="0">
+            <a:spAutoFit/>
+          </a:bodyPr>
+          <a:lstStyle/>
+          <a:p>
+            <a:r>
+              <a:rPr lang="en-US" altLang="ko-KR" dirty="0"/>
+              <a:t>Home</a:t>
+            </a:r>
+          </a:p>
+        </p:txBody>
+      </p:sp>
+      <p:sp>
+        <p:nvSpPr>
+          <p:cNvPr id="10" name="TextBox 9">
+            <a:extLst>
+              <a:ext uri="{FF2B5EF4-FFF2-40B4-BE49-F238E27FC236}">
+                <a16:creationId xmlns:a16="http://schemas.microsoft.com/office/drawing/2014/main" id="{20C6AB76-E825-DB4E-C20C-B8E35AEA2BBC}"/>
+              </a:ext>
+            </a:extLst>
+          </p:cNvPr>
+          <p:cNvSpPr txBox="1"/>
+          <p:nvPr/>
+        </p:nvSpPr>
+        <p:spPr>
+          <a:xfrm>
+            <a:off x="2991031" y="9588409"/>
+            <a:ext cx="761619" cy="369332"/>
+          </a:xfrm>
+          <a:prstGeom prst="rect">
+            <a:avLst/>
+          </a:prstGeom>
+          <a:noFill/>
+        </p:spPr>
+        <p:txBody>
+          <a:bodyPr wrap="none" rtlCol="0">
+            <a:spAutoFit/>
+          </a:bodyPr>
+          <a:lstStyle/>
+          <a:p>
+            <a:r>
+              <a:rPr lang="en-US" altLang="ko-KR" dirty="0"/>
+              <a:t>Status</a:t>
+            </a:r>
+          </a:p>
+        </p:txBody>
+      </p:sp>
+      <p:sp>
+        <p:nvSpPr>
+          <p:cNvPr id="11" name="TextBox 10">
+            <a:extLst>
+              <a:ext uri="{FF2B5EF4-FFF2-40B4-BE49-F238E27FC236}">
+                <a16:creationId xmlns:a16="http://schemas.microsoft.com/office/drawing/2014/main" id="{46A11555-3166-4E8C-4A7B-FF2F374E612B}"/>
+              </a:ext>
+            </a:extLst>
+          </p:cNvPr>
+          <p:cNvSpPr txBox="1"/>
+          <p:nvPr/>
+        </p:nvSpPr>
+        <p:spPr>
+          <a:xfrm>
+            <a:off x="5270207" y="9576039"/>
+            <a:ext cx="839012" cy="369332"/>
+          </a:xfrm>
+          <a:prstGeom prst="rect">
+            <a:avLst/>
+          </a:prstGeom>
+          <a:noFill/>
+        </p:spPr>
+        <p:txBody>
+          <a:bodyPr wrap="none" rtlCol="0">
+            <a:spAutoFit/>
+          </a:bodyPr>
+          <a:lstStyle/>
+          <a:p>
+            <a:r>
+              <a:rPr lang="en-US" altLang="ko-KR" dirty="0"/>
+              <a:t>Setting</a:t>
+            </a:r>
+          </a:p>
+        </p:txBody>
+      </p:sp>
+    </p:spTree>
+    <p:extLst>
+      <p:ext uri="{BB962C8B-B14F-4D97-AF65-F5344CB8AC3E}">
+        <p14:creationId xmlns:p14="http://schemas.microsoft.com/office/powerpoint/2010/main" val="2727306627"/>
+      </p:ext>
+    </p:extLst>
+  </p:cSld>
+  <p:clrMapOvr>
+    <a:masterClrMapping/>
+  </p:clrMapOvr>
 </p:sld>
 </file>
 
@@ -8195,12 +8643,42 @@
           <a:chExt cx="0" cy="0"/>
         </a:xfrm>
       </p:grpSpPr>
-      <p:sp>
-        <p:nvSpPr>
-          <p:cNvPr id="5" name="Rectangle 4">
-            <a:extLst>
-              <a:ext uri="{FF2B5EF4-FFF2-40B4-BE49-F238E27FC236}">
-                <a16:creationId xmlns:a16="http://schemas.microsoft.com/office/drawing/2014/main" id="{38C16829-798A-B1FA-6420-F068D5210254}"/>
+      <p:pic>
+        <p:nvPicPr>
+          <p:cNvPr id="4" name="Picture 3" descr="A couple of figures of people&#10;&#10;Description automatically generated with medium confidence">
+            <a:extLst>
+              <a:ext uri="{FF2B5EF4-FFF2-40B4-BE49-F238E27FC236}">
+                <a16:creationId xmlns:a16="http://schemas.microsoft.com/office/drawing/2014/main" id="{9C2202C7-D6A3-53BF-4574-2090319D4B37}"/>
+              </a:ext>
+            </a:extLst>
+          </p:cNvPr>
+          <p:cNvPicPr>
+            <a:picLocks noChangeAspect="1"/>
+          </p:cNvPicPr>
+          <p:nvPr/>
+        </p:nvPicPr>
+        <p:blipFill>
+          <a:blip r:embed="rId3"/>
+          <a:stretch>
+            <a:fillRect/>
+          </a:stretch>
+        </p:blipFill>
+        <p:spPr>
+          <a:xfrm>
+            <a:off x="709684" y="601041"/>
+            <a:ext cx="5235021" cy="4707041"/>
+          </a:xfrm>
+          <a:prstGeom prst="rect">
+            <a:avLst/>
+          </a:prstGeom>
+        </p:spPr>
+      </p:pic>
+      <p:sp>
+        <p:nvSpPr>
+          <p:cNvPr id="7" name="Rectangle 6">
+            <a:extLst>
+              <a:ext uri="{FF2B5EF4-FFF2-40B4-BE49-F238E27FC236}">
+                <a16:creationId xmlns:a16="http://schemas.microsoft.com/office/drawing/2014/main" id="{15ADC92D-2FEC-AA31-7C52-5FFD12730309}"/>
               </a:ext>
             </a:extLst>
           </p:cNvPr>
@@ -8209,8 +8687,8 @@
         </p:nvSpPr>
         <p:spPr>
           <a:xfrm>
-            <a:off x="0" y="0"/>
-            <a:ext cx="6732588" cy="586854"/>
+            <a:off x="0" y="9430602"/>
+            <a:ext cx="2174236" cy="684947"/>
           </a:xfrm>
           <a:prstGeom prst="rect">
             <a:avLst/>
@@ -8238,72 +8716,31 @@
           <a:lstStyle/>
           <a:p>
             <a:pPr algn="ctr"/>
-            <a:r>
-              <a:rPr lang="en-US" altLang="ko-KR" dirty="0"/>
-              <a:t>`</a:t>
-            </a:r>
-            <a:endParaRPr lang="ko-KR" altLang="en-US" dirty="0"/>
-          </a:p>
-        </p:txBody>
-      </p:sp>
-      <p:sp>
-        <p:nvSpPr>
-          <p:cNvPr id="6" name="TextBox 5">
-            <a:extLst>
-              <a:ext uri="{FF2B5EF4-FFF2-40B4-BE49-F238E27FC236}">
-                <a16:creationId xmlns:a16="http://schemas.microsoft.com/office/drawing/2014/main" id="{0EC09F9F-37DB-AB06-7540-8141473A97BD}"/>
-              </a:ext>
-            </a:extLst>
-          </p:cNvPr>
-          <p:cNvSpPr txBox="1"/>
+            <a:endParaRPr lang="ko-KR" altLang="en-US"/>
+          </a:p>
+        </p:txBody>
+      </p:sp>
+      <p:sp>
+        <p:nvSpPr>
+          <p:cNvPr id="8" name="Rectangle 7">
+            <a:extLst>
+              <a:ext uri="{FF2B5EF4-FFF2-40B4-BE49-F238E27FC236}">
+                <a16:creationId xmlns:a16="http://schemas.microsoft.com/office/drawing/2014/main" id="{72CCB441-F67B-8656-323E-CC40882EB5CE}"/>
+              </a:ext>
+            </a:extLst>
+          </p:cNvPr>
+          <p:cNvSpPr/>
           <p:nvPr/>
         </p:nvSpPr>
         <p:spPr>
           <a:xfrm>
-            <a:off x="270885" y="149719"/>
-            <a:ext cx="1040670" cy="369332"/>
+            <a:off x="2174236" y="9430602"/>
+            <a:ext cx="2384116" cy="684947"/>
           </a:xfrm>
           <a:prstGeom prst="rect">
             <a:avLst/>
           </a:prstGeom>
           <a:noFill/>
-        </p:spPr>
-        <p:txBody>
-          <a:bodyPr wrap="none" rtlCol="0">
-            <a:spAutoFit/>
-          </a:bodyPr>
-          <a:lstStyle/>
-          <a:p>
-            <a:r>
-              <a:rPr lang="en-US" altLang="ko-KR" dirty="0"/>
-              <a:t>&lt;   Bench</a:t>
-            </a:r>
-          </a:p>
-        </p:txBody>
-      </p:sp>
-      <p:sp>
-        <p:nvSpPr>
-          <p:cNvPr id="19" name="Rectangle 18">
-            <a:extLst>
-              <a:ext uri="{FF2B5EF4-FFF2-40B4-BE49-F238E27FC236}">
-                <a16:creationId xmlns:a16="http://schemas.microsoft.com/office/drawing/2014/main" id="{3A716BEA-4598-7A00-7C14-3863602539BD}"/>
-              </a:ext>
-            </a:extLst>
-          </p:cNvPr>
-          <p:cNvSpPr/>
-          <p:nvPr/>
-        </p:nvSpPr>
-        <p:spPr>
-          <a:xfrm>
-            <a:off x="355587" y="9071704"/>
-            <a:ext cx="2272352" cy="350520"/>
-          </a:xfrm>
-          <a:prstGeom prst="rect">
-            <a:avLst/>
-          </a:prstGeom>
-          <a:solidFill>
-            <a:schemeClr val="bg1"/>
-          </a:solidFill>
         </p:spPr>
         <p:style>
           <a:lnRef idx="2">
@@ -8332,10 +8769,10 @@
       </p:sp>
       <p:sp>
         <p:nvSpPr>
-          <p:cNvPr id="20" name="Rectangle 19">
-            <a:extLst>
-              <a:ext uri="{FF2B5EF4-FFF2-40B4-BE49-F238E27FC236}">
-                <a16:creationId xmlns:a16="http://schemas.microsoft.com/office/drawing/2014/main" id="{D7D5AB45-CA8E-E037-75FA-5AA88AB5518C}"/>
+          <p:cNvPr id="9" name="Rectangle 8">
+            <a:extLst>
+              <a:ext uri="{FF2B5EF4-FFF2-40B4-BE49-F238E27FC236}">
+                <a16:creationId xmlns:a16="http://schemas.microsoft.com/office/drawing/2014/main" id="{35EFF436-9B0F-879A-DB7F-D5D5EBD29EEB}"/>
               </a:ext>
             </a:extLst>
           </p:cNvPr>
@@ -8344,15 +8781,13 @@
         </p:nvSpPr>
         <p:spPr>
           <a:xfrm>
-            <a:off x="355587" y="9492619"/>
-            <a:ext cx="2272352" cy="350520"/>
+            <a:off x="4558352" y="9430602"/>
+            <a:ext cx="2174236" cy="684947"/>
           </a:xfrm>
           <a:prstGeom prst="rect">
             <a:avLst/>
           </a:prstGeom>
-          <a:solidFill>
-            <a:schemeClr val="bg1"/>
-          </a:solidFill>
+          <a:noFill/>
         </p:spPr>
         <p:style>
           <a:lnRef idx="2">
@@ -8381,97 +8816,25 @@
       </p:sp>
       <p:sp>
         <p:nvSpPr>
-          <p:cNvPr id="21" name="TextBox 20">
-            <a:extLst>
-              <a:ext uri="{FF2B5EF4-FFF2-40B4-BE49-F238E27FC236}">
-                <a16:creationId xmlns:a16="http://schemas.microsoft.com/office/drawing/2014/main" id="{6BDA41C4-B137-00C3-0A7E-DC2CBD6E9323}"/>
-              </a:ext>
-            </a:extLst>
-          </p:cNvPr>
-          <p:cNvSpPr txBox="1"/>
+          <p:cNvPr id="10" name="Rectangle 9">
+            <a:extLst>
+              <a:ext uri="{FF2B5EF4-FFF2-40B4-BE49-F238E27FC236}">
+                <a16:creationId xmlns:a16="http://schemas.microsoft.com/office/drawing/2014/main" id="{DB4875C2-467C-02F0-D573-534D2933C557}"/>
+              </a:ext>
+            </a:extLst>
+          </p:cNvPr>
+          <p:cNvSpPr/>
           <p:nvPr/>
         </p:nvSpPr>
         <p:spPr>
           <a:xfrm>
-            <a:off x="2725791" y="9050987"/>
-            <a:ext cx="413896" cy="369332"/>
+            <a:off x="0" y="5289794"/>
+            <a:ext cx="6732588" cy="586854"/>
           </a:xfrm>
           <a:prstGeom prst="rect">
             <a:avLst/>
           </a:prstGeom>
           <a:noFill/>
-        </p:spPr>
-        <p:txBody>
-          <a:bodyPr wrap="none" rtlCol="0">
-            <a:spAutoFit/>
-          </a:bodyPr>
-          <a:lstStyle/>
-          <a:p>
-            <a:r>
-              <a:rPr lang="en-US" altLang="ko-KR" dirty="0"/>
-              <a:t>Kg</a:t>
-            </a:r>
-          </a:p>
-        </p:txBody>
-      </p:sp>
-      <p:sp>
-        <p:nvSpPr>
-          <p:cNvPr id="22" name="TextBox 21">
-            <a:extLst>
-              <a:ext uri="{FF2B5EF4-FFF2-40B4-BE49-F238E27FC236}">
-                <a16:creationId xmlns:a16="http://schemas.microsoft.com/office/drawing/2014/main" id="{57A80F8D-66F8-BA76-7D2A-53B045D52A1C}"/>
-              </a:ext>
-            </a:extLst>
-          </p:cNvPr>
-          <p:cNvSpPr txBox="1"/>
-          <p:nvPr/>
-        </p:nvSpPr>
-        <p:spPr>
-          <a:xfrm>
-            <a:off x="2734774" y="9452158"/>
-            <a:ext cx="631520" cy="369332"/>
-          </a:xfrm>
-          <a:prstGeom prst="rect">
-            <a:avLst/>
-          </a:prstGeom>
-          <a:noFill/>
-        </p:spPr>
-        <p:txBody>
-          <a:bodyPr wrap="none" rtlCol="0">
-            <a:spAutoFit/>
-          </a:bodyPr>
-          <a:lstStyle/>
-          <a:p>
-            <a:r>
-              <a:rPr lang="en-US" altLang="ko-KR" dirty="0"/>
-              <a:t>Reps</a:t>
-            </a:r>
-          </a:p>
-        </p:txBody>
-      </p:sp>
-      <p:sp>
-        <p:nvSpPr>
-          <p:cNvPr id="23" name="Rectangle: Rounded Corners 22">
-            <a:extLst>
-              <a:ext uri="{FF2B5EF4-FFF2-40B4-BE49-F238E27FC236}">
-                <a16:creationId xmlns:a16="http://schemas.microsoft.com/office/drawing/2014/main" id="{F9DB3C25-5456-C30C-E36B-02820F9C831A}"/>
-              </a:ext>
-            </a:extLst>
-          </p:cNvPr>
-          <p:cNvSpPr/>
-          <p:nvPr/>
-        </p:nvSpPr>
-        <p:spPr>
-          <a:xfrm>
-            <a:off x="3592903" y="9420319"/>
-            <a:ext cx="2784098" cy="401171"/>
-          </a:xfrm>
-          <a:prstGeom prst="roundRect">
-            <a:avLst/>
-          </a:prstGeom>
-          <a:solidFill>
-            <a:srgbClr val="952613"/>
-          </a:solidFill>
         </p:spPr>
         <p:style>
           <a:lnRef idx="2">
@@ -8494,11 +8857,1511 @@
           <a:lstStyle/>
           <a:p>
             <a:pPr algn="ctr"/>
+            <a:endParaRPr lang="ko-KR" altLang="en-US"/>
+          </a:p>
+        </p:txBody>
+      </p:sp>
+      <p:pic>
+        <p:nvPicPr>
+          <p:cNvPr id="12" name="Picture 11">
+            <a:extLst>
+              <a:ext uri="{FF2B5EF4-FFF2-40B4-BE49-F238E27FC236}">
+                <a16:creationId xmlns:a16="http://schemas.microsoft.com/office/drawing/2014/main" id="{6D991708-EBEF-DC15-97F2-76FAC3DB848F}"/>
+              </a:ext>
+            </a:extLst>
+          </p:cNvPr>
+          <p:cNvPicPr>
+            <a:picLocks noChangeAspect="1"/>
+          </p:cNvPicPr>
+          <p:nvPr/>
+        </p:nvPicPr>
+        <p:blipFill>
+          <a:blip r:embed="rId4"/>
+          <a:stretch>
+            <a:fillRect/>
+          </a:stretch>
+        </p:blipFill>
+        <p:spPr>
+          <a:xfrm>
+            <a:off x="7003473" y="0"/>
+            <a:ext cx="6732588" cy="4335379"/>
+          </a:xfrm>
+          <a:prstGeom prst="rect">
+            <a:avLst/>
+          </a:prstGeom>
+        </p:spPr>
+      </p:pic>
+      <p:sp>
+        <p:nvSpPr>
+          <p:cNvPr id="15" name="TextBox 14">
+            <a:extLst>
+              <a:ext uri="{FF2B5EF4-FFF2-40B4-BE49-F238E27FC236}">
+                <a16:creationId xmlns:a16="http://schemas.microsoft.com/office/drawing/2014/main" id="{5CF2E822-FD74-658F-CCF1-459573FA7156}"/>
+              </a:ext>
+            </a:extLst>
+          </p:cNvPr>
+          <p:cNvSpPr txBox="1"/>
+          <p:nvPr/>
+        </p:nvSpPr>
+        <p:spPr>
+          <a:xfrm>
+            <a:off x="4228280" y="5398555"/>
+            <a:ext cx="719171" cy="369332"/>
+          </a:xfrm>
+          <a:prstGeom prst="rect">
+            <a:avLst/>
+          </a:prstGeom>
+          <a:noFill/>
+        </p:spPr>
+        <p:txBody>
+          <a:bodyPr wrap="none" rtlCol="0">
+            <a:spAutoFit/>
+          </a:bodyPr>
+          <a:lstStyle/>
+          <a:p>
             <a:r>
-              <a:rPr lang="en-US" altLang="ko-KR" b="1" dirty="0"/>
+              <a:rPr lang="en-GB" altLang="ko-KR" dirty="0"/>
+              <a:t>Filter </a:t>
+            </a:r>
+            <a:endParaRPr lang="ko-KR" altLang="en-US" dirty="0"/>
+          </a:p>
+        </p:txBody>
+      </p:sp>
+      <p:sp>
+        <p:nvSpPr>
+          <p:cNvPr id="16" name="TextBox 15">
+            <a:extLst>
+              <a:ext uri="{FF2B5EF4-FFF2-40B4-BE49-F238E27FC236}">
+                <a16:creationId xmlns:a16="http://schemas.microsoft.com/office/drawing/2014/main" id="{6191AD7B-B3D4-4A52-7460-012C766BACD4}"/>
+              </a:ext>
+            </a:extLst>
+          </p:cNvPr>
+          <p:cNvSpPr txBox="1"/>
+          <p:nvPr/>
+        </p:nvSpPr>
+        <p:spPr>
+          <a:xfrm>
+            <a:off x="4947451" y="5390193"/>
+            <a:ext cx="859531" cy="369332"/>
+          </a:xfrm>
+          <a:prstGeom prst="rect">
+            <a:avLst/>
+          </a:prstGeom>
+          <a:noFill/>
+        </p:spPr>
+        <p:txBody>
+          <a:bodyPr wrap="none" rtlCol="0">
+            <a:spAutoFit/>
+          </a:bodyPr>
+          <a:lstStyle/>
+          <a:p>
+            <a:r>
+              <a:rPr lang="en-GB" altLang="ko-KR" dirty="0"/>
+              <a:t>Muscle</a:t>
+            </a:r>
+            <a:endParaRPr lang="ko-KR" altLang="en-US" dirty="0"/>
+          </a:p>
+        </p:txBody>
+      </p:sp>
+      <p:sp>
+        <p:nvSpPr>
+          <p:cNvPr id="17" name="TextBox 16">
+            <a:extLst>
+              <a:ext uri="{FF2B5EF4-FFF2-40B4-BE49-F238E27FC236}">
+                <a16:creationId xmlns:a16="http://schemas.microsoft.com/office/drawing/2014/main" id="{92ED1616-8844-D0D0-513D-85650D8C292A}"/>
+              </a:ext>
+            </a:extLst>
+          </p:cNvPr>
+          <p:cNvSpPr txBox="1"/>
+          <p:nvPr/>
+        </p:nvSpPr>
+        <p:spPr>
+          <a:xfrm>
+            <a:off x="5880591" y="5386168"/>
+            <a:ext cx="498470" cy="369332"/>
+          </a:xfrm>
+          <a:prstGeom prst="rect">
+            <a:avLst/>
+          </a:prstGeom>
+          <a:noFill/>
+        </p:spPr>
+        <p:txBody>
+          <a:bodyPr wrap="none" rtlCol="0">
+            <a:spAutoFit/>
+          </a:bodyPr>
+          <a:lstStyle/>
+          <a:p>
+            <a:r>
+              <a:rPr lang="en-GB" altLang="ko-KR" dirty="0"/>
+              <a:t>Tag</a:t>
+            </a:r>
+            <a:endParaRPr lang="ko-KR" altLang="en-US" dirty="0"/>
+          </a:p>
+        </p:txBody>
+      </p:sp>
+      <p:sp>
+        <p:nvSpPr>
+          <p:cNvPr id="2" name="Rectangle 1">
+            <a:extLst>
+              <a:ext uri="{FF2B5EF4-FFF2-40B4-BE49-F238E27FC236}">
+                <a16:creationId xmlns:a16="http://schemas.microsoft.com/office/drawing/2014/main" id="{34D3E9FF-7EA2-DBB6-3B31-CF2A0DDD5061}"/>
+              </a:ext>
+            </a:extLst>
+          </p:cNvPr>
+          <p:cNvSpPr/>
+          <p:nvPr/>
+        </p:nvSpPr>
+        <p:spPr>
+          <a:xfrm>
+            <a:off x="0" y="0"/>
+            <a:ext cx="6732588" cy="586854"/>
+          </a:xfrm>
+          <a:prstGeom prst="rect">
+            <a:avLst/>
+          </a:prstGeom>
+          <a:noFill/>
+        </p:spPr>
+        <p:style>
+          <a:lnRef idx="2">
+            <a:schemeClr val="accent1">
+              <a:shade val="15000"/>
+            </a:schemeClr>
+          </a:lnRef>
+          <a:fillRef idx="1">
+            <a:schemeClr val="accent1"/>
+          </a:fillRef>
+          <a:effectRef idx="0">
+            <a:schemeClr val="accent1"/>
+          </a:effectRef>
+          <a:fontRef idx="minor">
+            <a:schemeClr val="lt1"/>
+          </a:fontRef>
+        </p:style>
+        <p:txBody>
+          <a:bodyPr rtlCol="0" anchor="ctr"/>
+          <a:lstStyle/>
+          <a:p>
+            <a:pPr algn="ctr"/>
+            <a:endParaRPr lang="ko-KR" altLang="en-US" dirty="0"/>
+          </a:p>
+        </p:txBody>
+      </p:sp>
+      <p:sp>
+        <p:nvSpPr>
+          <p:cNvPr id="3" name="TextBox 2">
+            <a:extLst>
+              <a:ext uri="{FF2B5EF4-FFF2-40B4-BE49-F238E27FC236}">
+                <a16:creationId xmlns:a16="http://schemas.microsoft.com/office/drawing/2014/main" id="{3373A36B-156B-723C-66ED-29B28A92FD4D}"/>
+              </a:ext>
+            </a:extLst>
+          </p:cNvPr>
+          <p:cNvSpPr txBox="1"/>
+          <p:nvPr/>
+        </p:nvSpPr>
+        <p:spPr>
+          <a:xfrm>
+            <a:off x="270885" y="149719"/>
+            <a:ext cx="750526" cy="369332"/>
+          </a:xfrm>
+          <a:prstGeom prst="rect">
+            <a:avLst/>
+          </a:prstGeom>
+          <a:noFill/>
+        </p:spPr>
+        <p:txBody>
+          <a:bodyPr wrap="none" rtlCol="0">
+            <a:spAutoFit/>
+          </a:bodyPr>
+          <a:lstStyle/>
+          <a:p>
+            <a:r>
+              <a:rPr lang="en-US" altLang="ko-KR" dirty="0"/>
+              <a:t>Home</a:t>
+            </a:r>
+          </a:p>
+        </p:txBody>
+      </p:sp>
+      <p:sp>
+        <p:nvSpPr>
+          <p:cNvPr id="11" name="TextBox 10">
+            <a:extLst>
+              <a:ext uri="{FF2B5EF4-FFF2-40B4-BE49-F238E27FC236}">
+                <a16:creationId xmlns:a16="http://schemas.microsoft.com/office/drawing/2014/main" id="{8247F351-3275-1DC7-98A4-0AB8580F5024}"/>
+              </a:ext>
+            </a:extLst>
+          </p:cNvPr>
+          <p:cNvSpPr txBox="1"/>
+          <p:nvPr/>
+        </p:nvSpPr>
+        <p:spPr>
+          <a:xfrm>
+            <a:off x="709684" y="9589675"/>
+            <a:ext cx="750526" cy="369332"/>
+          </a:xfrm>
+          <a:prstGeom prst="rect">
+            <a:avLst/>
+          </a:prstGeom>
+          <a:noFill/>
+        </p:spPr>
+        <p:txBody>
+          <a:bodyPr wrap="none" rtlCol="0">
+            <a:spAutoFit/>
+          </a:bodyPr>
+          <a:lstStyle/>
+          <a:p>
+            <a:r>
+              <a:rPr lang="en-US" altLang="ko-KR" dirty="0"/>
+              <a:t>Home</a:t>
+            </a:r>
+          </a:p>
+        </p:txBody>
+      </p:sp>
+      <p:sp>
+        <p:nvSpPr>
+          <p:cNvPr id="18" name="TextBox 17">
+            <a:extLst>
+              <a:ext uri="{FF2B5EF4-FFF2-40B4-BE49-F238E27FC236}">
+                <a16:creationId xmlns:a16="http://schemas.microsoft.com/office/drawing/2014/main" id="{E591C087-C637-7BAE-5CB6-A7625EC8372A}"/>
+              </a:ext>
+            </a:extLst>
+          </p:cNvPr>
+          <p:cNvSpPr txBox="1"/>
+          <p:nvPr/>
+        </p:nvSpPr>
+        <p:spPr>
+          <a:xfrm>
+            <a:off x="2991031" y="9602057"/>
+            <a:ext cx="761619" cy="369332"/>
+          </a:xfrm>
+          <a:prstGeom prst="rect">
+            <a:avLst/>
+          </a:prstGeom>
+          <a:noFill/>
+        </p:spPr>
+        <p:txBody>
+          <a:bodyPr wrap="none" rtlCol="0">
+            <a:spAutoFit/>
+          </a:bodyPr>
+          <a:lstStyle/>
+          <a:p>
+            <a:r>
+              <a:rPr lang="en-US" altLang="ko-KR" dirty="0"/>
+              <a:t>Status</a:t>
+            </a:r>
+          </a:p>
+        </p:txBody>
+      </p:sp>
+      <p:sp>
+        <p:nvSpPr>
+          <p:cNvPr id="19" name="TextBox 18">
+            <a:extLst>
+              <a:ext uri="{FF2B5EF4-FFF2-40B4-BE49-F238E27FC236}">
+                <a16:creationId xmlns:a16="http://schemas.microsoft.com/office/drawing/2014/main" id="{44E01C12-20A5-A7E0-D1A0-4040028AA740}"/>
+              </a:ext>
+            </a:extLst>
+          </p:cNvPr>
+          <p:cNvSpPr txBox="1"/>
+          <p:nvPr/>
+        </p:nvSpPr>
+        <p:spPr>
+          <a:xfrm>
+            <a:off x="5270207" y="9576039"/>
+            <a:ext cx="839012" cy="369332"/>
+          </a:xfrm>
+          <a:prstGeom prst="rect">
+            <a:avLst/>
+          </a:prstGeom>
+          <a:noFill/>
+        </p:spPr>
+        <p:txBody>
+          <a:bodyPr wrap="none" rtlCol="0">
+            <a:spAutoFit/>
+          </a:bodyPr>
+          <a:lstStyle/>
+          <a:p>
+            <a:r>
+              <a:rPr lang="en-US" altLang="ko-KR" dirty="0"/>
+              <a:t>Setting</a:t>
+            </a:r>
+          </a:p>
+        </p:txBody>
+      </p:sp>
+      <p:pic>
+        <p:nvPicPr>
+          <p:cNvPr id="41" name="Picture 40">
+            <a:extLst>
+              <a:ext uri="{FF2B5EF4-FFF2-40B4-BE49-F238E27FC236}">
+                <a16:creationId xmlns:a16="http://schemas.microsoft.com/office/drawing/2014/main" id="{5B9F5439-36FB-7D5D-FB97-829E307EFBDA}"/>
+              </a:ext>
+            </a:extLst>
+          </p:cNvPr>
+          <p:cNvPicPr>
+            <a:picLocks noChangeAspect="1"/>
+          </p:cNvPicPr>
+          <p:nvPr/>
+        </p:nvPicPr>
+        <p:blipFill rotWithShape="1">
+          <a:blip r:embed="rId4"/>
+          <a:srcRect l="73584" r="11415"/>
+          <a:stretch/>
+        </p:blipFill>
+        <p:spPr>
+          <a:xfrm>
+            <a:off x="-1677641" y="722395"/>
+            <a:ext cx="1009936" cy="4335379"/>
+          </a:xfrm>
+          <a:prstGeom prst="rect">
+            <a:avLst/>
+          </a:prstGeom>
+        </p:spPr>
+      </p:pic>
+      <p:pic>
+        <p:nvPicPr>
+          <p:cNvPr id="42" name="Picture 41">
+            <a:extLst>
+              <a:ext uri="{FF2B5EF4-FFF2-40B4-BE49-F238E27FC236}">
+                <a16:creationId xmlns:a16="http://schemas.microsoft.com/office/drawing/2014/main" id="{0CF262EE-A4E3-B4D6-2819-63E4BB80F752}"/>
+              </a:ext>
+            </a:extLst>
+          </p:cNvPr>
+          <p:cNvPicPr>
+            <a:picLocks noChangeAspect="1"/>
+          </p:cNvPicPr>
+          <p:nvPr/>
+        </p:nvPicPr>
+        <p:blipFill rotWithShape="1">
+          <a:blip r:embed="rId4"/>
+          <a:srcRect l="11415" r="73584"/>
+          <a:stretch/>
+        </p:blipFill>
+        <p:spPr>
+          <a:xfrm>
+            <a:off x="-2869237" y="722396"/>
+            <a:ext cx="1009935" cy="4335379"/>
+          </a:xfrm>
+          <a:prstGeom prst="rect">
+            <a:avLst/>
+          </a:prstGeom>
+        </p:spPr>
+      </p:pic>
+      <p:pic>
+        <p:nvPicPr>
+          <p:cNvPr id="44" name="Picture 43">
+            <a:extLst>
+              <a:ext uri="{FF2B5EF4-FFF2-40B4-BE49-F238E27FC236}">
+                <a16:creationId xmlns:a16="http://schemas.microsoft.com/office/drawing/2014/main" id="{1972470E-0BFC-0DDD-4BE6-3CF29FFD6347}"/>
+              </a:ext>
+            </a:extLst>
+          </p:cNvPr>
+          <p:cNvPicPr>
+            <a:picLocks noChangeAspect="1"/>
+          </p:cNvPicPr>
+          <p:nvPr/>
+        </p:nvPicPr>
+        <p:blipFill>
+          <a:blip r:embed="rId5"/>
+          <a:stretch>
+            <a:fillRect/>
+          </a:stretch>
+        </p:blipFill>
+        <p:spPr>
+          <a:xfrm>
+            <a:off x="7109261" y="4652905"/>
+            <a:ext cx="5839640" cy="809738"/>
+          </a:xfrm>
+          <a:prstGeom prst="rect">
+            <a:avLst/>
+          </a:prstGeom>
+        </p:spPr>
+      </p:pic>
+      <p:cxnSp>
+        <p:nvCxnSpPr>
+          <p:cNvPr id="68" name="Straight Connector 67">
+            <a:extLst>
+              <a:ext uri="{FF2B5EF4-FFF2-40B4-BE49-F238E27FC236}">
+                <a16:creationId xmlns:a16="http://schemas.microsoft.com/office/drawing/2014/main" id="{25E6985F-9F0A-52BD-7B1D-FF0DF2549FEA}"/>
+              </a:ext>
+            </a:extLst>
+          </p:cNvPr>
+          <p:cNvCxnSpPr/>
+          <p:nvPr/>
+        </p:nvCxnSpPr>
+        <p:spPr>
+          <a:xfrm>
+            <a:off x="6436399" y="6034455"/>
+            <a:ext cx="0" cy="3098042"/>
+          </a:xfrm>
+          <a:prstGeom prst="line">
+            <a:avLst/>
+          </a:prstGeom>
+          <a:ln w="95250">
+            <a:solidFill>
+              <a:schemeClr val="bg1">
+                <a:lumMod val="85000"/>
+              </a:schemeClr>
+            </a:solidFill>
+          </a:ln>
+        </p:spPr>
+        <p:style>
+          <a:lnRef idx="1">
+            <a:schemeClr val="accent1"/>
+          </a:lnRef>
+          <a:fillRef idx="0">
+            <a:schemeClr val="accent1"/>
+          </a:fillRef>
+          <a:effectRef idx="0">
+            <a:schemeClr val="accent1"/>
+          </a:effectRef>
+          <a:fontRef idx="minor">
+            <a:schemeClr val="tx1"/>
+          </a:fontRef>
+        </p:style>
+      </p:cxnSp>
+      <p:grpSp>
+        <p:nvGrpSpPr>
+          <p:cNvPr id="70" name="Group 69">
+            <a:extLst>
+              <a:ext uri="{FF2B5EF4-FFF2-40B4-BE49-F238E27FC236}">
+                <a16:creationId xmlns:a16="http://schemas.microsoft.com/office/drawing/2014/main" id="{2F732F90-E000-0C2C-62D9-FD8C6F7785AE}"/>
+              </a:ext>
+            </a:extLst>
+          </p:cNvPr>
+          <p:cNvGrpSpPr/>
+          <p:nvPr/>
+        </p:nvGrpSpPr>
+        <p:grpSpPr>
+          <a:xfrm>
+            <a:off x="129788" y="6034455"/>
+            <a:ext cx="6000038" cy="1237843"/>
+            <a:chOff x="129788" y="6034455"/>
+            <a:chExt cx="6000038" cy="1237843"/>
+          </a:xfrm>
+        </p:grpSpPr>
+        <p:grpSp>
+          <p:nvGrpSpPr>
+            <p:cNvPr id="43" name="Group 42">
+              <a:extLst>
+                <a:ext uri="{FF2B5EF4-FFF2-40B4-BE49-F238E27FC236}">
+                  <a16:creationId xmlns:a16="http://schemas.microsoft.com/office/drawing/2014/main" id="{8ECCC5CB-97F0-DAF5-28B9-AA8F73EE7BF2}"/>
+                </a:ext>
+              </a:extLst>
+            </p:cNvPr>
+            <p:cNvGrpSpPr/>
+            <p:nvPr/>
+          </p:nvGrpSpPr>
+          <p:grpSpPr>
+            <a:xfrm>
+              <a:off x="129788" y="6034455"/>
+              <a:ext cx="6000038" cy="1237843"/>
+              <a:chOff x="270885" y="2296926"/>
+              <a:chExt cx="6000038" cy="1237843"/>
+            </a:xfrm>
+          </p:grpSpPr>
+          <p:sp>
+            <p:nvSpPr>
+              <p:cNvPr id="45" name="Rectangle 44">
+                <a:extLst>
+                  <a:ext uri="{FF2B5EF4-FFF2-40B4-BE49-F238E27FC236}">
+                    <a16:creationId xmlns:a16="http://schemas.microsoft.com/office/drawing/2014/main" id="{4470F9BD-ED66-9D8C-3C82-FF5B33A98639}"/>
+                  </a:ext>
+                </a:extLst>
+              </p:cNvPr>
+              <p:cNvSpPr/>
+              <p:nvPr/>
+            </p:nvSpPr>
+            <p:spPr>
+              <a:xfrm>
+                <a:off x="270885" y="2296926"/>
+                <a:ext cx="6000038" cy="1237843"/>
+              </a:xfrm>
+              <a:prstGeom prst="rect">
+                <a:avLst/>
+              </a:prstGeom>
+              <a:noFill/>
+            </p:spPr>
+            <p:style>
+              <a:lnRef idx="2">
+                <a:schemeClr val="accent1">
+                  <a:shade val="15000"/>
+                </a:schemeClr>
+              </a:lnRef>
+              <a:fillRef idx="1">
+                <a:schemeClr val="accent1"/>
+              </a:fillRef>
+              <a:effectRef idx="0">
+                <a:schemeClr val="accent1"/>
+              </a:effectRef>
+              <a:fontRef idx="minor">
+                <a:schemeClr val="lt1"/>
+              </a:fontRef>
+            </p:style>
+            <p:txBody>
+              <a:bodyPr rtlCol="0" anchor="ctr"/>
+              <a:lstStyle/>
+              <a:p>
+                <a:pPr algn="ctr"/>
+                <a:endParaRPr lang="ko-KR" altLang="en-US"/>
+              </a:p>
+            </p:txBody>
+          </p:sp>
+          <p:sp>
+            <p:nvSpPr>
+              <p:cNvPr id="46" name="TextBox 45">
+                <a:extLst>
+                  <a:ext uri="{FF2B5EF4-FFF2-40B4-BE49-F238E27FC236}">
+                    <a16:creationId xmlns:a16="http://schemas.microsoft.com/office/drawing/2014/main" id="{972A0ABA-9BF4-C503-2B7C-2CDA29FFE6B1}"/>
+                  </a:ext>
+                </a:extLst>
+              </p:cNvPr>
+              <p:cNvSpPr txBox="1"/>
+              <p:nvPr/>
+            </p:nvSpPr>
+            <p:spPr>
+              <a:xfrm>
+                <a:off x="406103" y="2352057"/>
+                <a:ext cx="766557" cy="369332"/>
+              </a:xfrm>
+              <a:prstGeom prst="rect">
+                <a:avLst/>
+              </a:prstGeom>
+              <a:noFill/>
+            </p:spPr>
+            <p:txBody>
+              <a:bodyPr wrap="none" rtlCol="0">
+                <a:spAutoFit/>
+              </a:bodyPr>
+              <a:lstStyle/>
+              <a:p>
+                <a:r>
+                  <a:rPr lang="en-US" altLang="ko-KR" b="1" dirty="0"/>
+                  <a:t>Bench</a:t>
+                </a:r>
+                <a:endParaRPr lang="ko-KR" altLang="en-US" b="1" dirty="0"/>
+              </a:p>
+            </p:txBody>
+          </p:sp>
+          <p:sp>
+            <p:nvSpPr>
+              <p:cNvPr id="47" name="TextBox 46">
+                <a:extLst>
+                  <a:ext uri="{FF2B5EF4-FFF2-40B4-BE49-F238E27FC236}">
+                    <a16:creationId xmlns:a16="http://schemas.microsoft.com/office/drawing/2014/main" id="{A6A5237B-E9C3-FB7D-8E1F-244F51994E66}"/>
+                  </a:ext>
+                </a:extLst>
+              </p:cNvPr>
+              <p:cNvSpPr txBox="1"/>
+              <p:nvPr/>
+            </p:nvSpPr>
+            <p:spPr>
+              <a:xfrm>
+                <a:off x="406103" y="2621818"/>
+                <a:ext cx="2865400" cy="369332"/>
+              </a:xfrm>
+              <a:prstGeom prst="rect">
+                <a:avLst/>
+              </a:prstGeom>
+              <a:noFill/>
+            </p:spPr>
+            <p:txBody>
+              <a:bodyPr wrap="none" rtlCol="0">
+                <a:spAutoFit/>
+              </a:bodyPr>
+              <a:lstStyle/>
+              <a:p>
+                <a:r>
+                  <a:rPr lang="en-US" altLang="ko-KR" dirty="0">
+                    <a:solidFill>
+                      <a:schemeClr val="bg2">
+                        <a:lumMod val="75000"/>
+                      </a:schemeClr>
+                    </a:solidFill>
+                  </a:rPr>
+                  <a:t>Last exercise : 27 – 02 - 2001</a:t>
+                </a:r>
+                <a:endParaRPr lang="ko-KR" altLang="en-US" dirty="0">
+                  <a:solidFill>
+                    <a:schemeClr val="bg2">
+                      <a:lumMod val="75000"/>
+                    </a:schemeClr>
+                  </a:solidFill>
+                </a:endParaRPr>
+              </a:p>
+            </p:txBody>
+          </p:sp>
+          <p:sp>
+            <p:nvSpPr>
+              <p:cNvPr id="48" name="TextBox 47">
+                <a:extLst>
+                  <a:ext uri="{FF2B5EF4-FFF2-40B4-BE49-F238E27FC236}">
+                    <a16:creationId xmlns:a16="http://schemas.microsoft.com/office/drawing/2014/main" id="{D58CAE2A-08EF-13D1-83F9-66181F5FCB9F}"/>
+                  </a:ext>
+                </a:extLst>
+              </p:cNvPr>
+              <p:cNvSpPr txBox="1"/>
+              <p:nvPr/>
+            </p:nvSpPr>
+            <p:spPr>
+              <a:xfrm>
+                <a:off x="437285" y="2947177"/>
+                <a:ext cx="1867819" cy="584775"/>
+              </a:xfrm>
+              <a:prstGeom prst="rect">
+                <a:avLst/>
+              </a:prstGeom>
+              <a:noFill/>
+            </p:spPr>
+            <p:txBody>
+              <a:bodyPr wrap="none" rtlCol="0">
+                <a:spAutoFit/>
+              </a:bodyPr>
+              <a:lstStyle/>
+              <a:p>
+                <a:r>
+                  <a:rPr lang="en-US" altLang="ko-KR" sz="1600" dirty="0">
+                    <a:latin typeface="Cascadia Mono" panose="020B0609020000020004" pitchFamily="49" charset="0"/>
+                    <a:cs typeface="Cascadia Mono" panose="020B0609020000020004" pitchFamily="49" charset="0"/>
+                  </a:rPr>
+                  <a:t>Main : chest</a:t>
+                </a:r>
+              </a:p>
+              <a:p>
+                <a:r>
+                  <a:rPr lang="en-US" altLang="ko-KR" sz="1600" dirty="0">
+                    <a:latin typeface="Cascadia Mono" panose="020B0609020000020004" pitchFamily="49" charset="0"/>
+                    <a:cs typeface="Cascadia Mono" panose="020B0609020000020004" pitchFamily="49" charset="0"/>
+                  </a:rPr>
+                  <a:t>Sub  : forearm</a:t>
+                </a:r>
+                <a:endParaRPr lang="ko-KR" altLang="en-US" sz="1600" dirty="0">
+                  <a:latin typeface="Cascadia Mono" panose="020B0609020000020004" pitchFamily="49" charset="0"/>
+                  <a:cs typeface="Cascadia Mono" panose="020B0609020000020004" pitchFamily="49" charset="0"/>
+                </a:endParaRPr>
+              </a:p>
+            </p:txBody>
+          </p:sp>
+          <p:sp>
+            <p:nvSpPr>
+              <p:cNvPr id="49" name="TextBox 48">
+                <a:extLst>
+                  <a:ext uri="{FF2B5EF4-FFF2-40B4-BE49-F238E27FC236}">
+                    <a16:creationId xmlns:a16="http://schemas.microsoft.com/office/drawing/2014/main" id="{2727A0A3-262A-0744-2352-0572765E56C1}"/>
+                  </a:ext>
+                </a:extLst>
+              </p:cNvPr>
+              <p:cNvSpPr txBox="1"/>
+              <p:nvPr/>
+            </p:nvSpPr>
+            <p:spPr>
+              <a:xfrm>
+                <a:off x="1172660" y="2342043"/>
+                <a:ext cx="1908408" cy="369332"/>
+              </a:xfrm>
+              <a:prstGeom prst="rect">
+                <a:avLst/>
+              </a:prstGeom>
+              <a:noFill/>
+            </p:spPr>
+            <p:txBody>
+              <a:bodyPr wrap="none" rtlCol="0">
+                <a:spAutoFit/>
+              </a:bodyPr>
+              <a:lstStyle/>
+              <a:p>
+                <a:r>
+                  <a:rPr lang="en-US" altLang="ko-KR" dirty="0">
+                    <a:solidFill>
+                      <a:schemeClr val="bg2">
+                        <a:lumMod val="75000"/>
+                      </a:schemeClr>
+                    </a:solidFill>
+                  </a:rPr>
+                  <a:t># push   # Monday</a:t>
+                </a:r>
+                <a:endParaRPr lang="ko-KR" altLang="en-US" dirty="0">
+                  <a:solidFill>
+                    <a:schemeClr val="bg2">
+                      <a:lumMod val="75000"/>
+                    </a:schemeClr>
+                  </a:solidFill>
+                </a:endParaRPr>
+              </a:p>
+            </p:txBody>
+          </p:sp>
+        </p:grpSp>
+        <p:sp>
+          <p:nvSpPr>
+            <p:cNvPr id="69" name="TextBox 68">
+              <a:extLst>
+                <a:ext uri="{FF2B5EF4-FFF2-40B4-BE49-F238E27FC236}">
+                  <a16:creationId xmlns:a16="http://schemas.microsoft.com/office/drawing/2014/main" id="{BBBA9F75-88D1-0ACA-330C-0D131B52BFA0}"/>
+                </a:ext>
+              </a:extLst>
+            </p:cNvPr>
+            <p:cNvSpPr txBox="1"/>
+            <p:nvPr/>
+          </p:nvSpPr>
+          <p:spPr>
+            <a:xfrm>
+              <a:off x="4399793" y="6034455"/>
+              <a:ext cx="1693028" cy="1200329"/>
+            </a:xfrm>
+            <a:prstGeom prst="rect">
+              <a:avLst/>
+            </a:prstGeom>
+            <a:noFill/>
+          </p:spPr>
+          <p:txBody>
+            <a:bodyPr wrap="none" rtlCol="0">
+              <a:spAutoFit/>
+            </a:bodyPr>
+            <a:lstStyle/>
+            <a:p>
+              <a:pPr algn="ctr"/>
+              <a:r>
+                <a:rPr lang="en-US" altLang="ko-KR" dirty="0"/>
+                <a:t>Personal Record</a:t>
+              </a:r>
+            </a:p>
+            <a:p>
+              <a:pPr algn="ctr"/>
+              <a:r>
+                <a:rPr lang="en-US" altLang="ko-KR" dirty="0"/>
+                <a:t>100 kg </a:t>
+              </a:r>
+            </a:p>
+            <a:p>
+              <a:pPr algn="ctr"/>
+              <a:r>
+                <a:rPr lang="en-US" altLang="ko-KR" dirty="0">
+                  <a:solidFill>
+                    <a:schemeClr val="bg2">
+                      <a:lumMod val="75000"/>
+                    </a:schemeClr>
+                  </a:solidFill>
+                </a:rPr>
+                <a:t>:27 – 02 - 2001</a:t>
+              </a:r>
+              <a:endParaRPr lang="en-US" altLang="ko-KR" dirty="0"/>
+            </a:p>
+            <a:p>
+              <a:pPr algn="ctr"/>
+              <a:r>
+                <a:rPr lang="en-US" altLang="ko-KR" dirty="0">
+                  <a:solidFill>
+                    <a:schemeClr val="bg2">
+                      <a:lumMod val="75000"/>
+                    </a:schemeClr>
+                  </a:solidFill>
+                </a:rPr>
+                <a:t>(4 days ago)</a:t>
+              </a:r>
+              <a:endParaRPr lang="ko-KR" altLang="en-US" dirty="0">
+                <a:solidFill>
+                  <a:schemeClr val="bg2">
+                    <a:lumMod val="75000"/>
+                  </a:schemeClr>
+                </a:solidFill>
+              </a:endParaRPr>
+            </a:p>
+          </p:txBody>
+        </p:sp>
+      </p:grpSp>
+      <p:grpSp>
+        <p:nvGrpSpPr>
+          <p:cNvPr id="71" name="Group 70">
+            <a:extLst>
+              <a:ext uri="{FF2B5EF4-FFF2-40B4-BE49-F238E27FC236}">
+                <a16:creationId xmlns:a16="http://schemas.microsoft.com/office/drawing/2014/main" id="{56667CE6-070E-3155-08D4-D196A3CD396D}"/>
+              </a:ext>
+            </a:extLst>
+          </p:cNvPr>
+          <p:cNvGrpSpPr/>
+          <p:nvPr/>
+        </p:nvGrpSpPr>
+        <p:grpSpPr>
+          <a:xfrm>
+            <a:off x="129788" y="7458879"/>
+            <a:ext cx="6000038" cy="1237843"/>
+            <a:chOff x="129788" y="6034455"/>
+            <a:chExt cx="6000038" cy="1237843"/>
+          </a:xfrm>
+        </p:grpSpPr>
+        <p:grpSp>
+          <p:nvGrpSpPr>
+            <p:cNvPr id="72" name="Group 71">
+              <a:extLst>
+                <a:ext uri="{FF2B5EF4-FFF2-40B4-BE49-F238E27FC236}">
+                  <a16:creationId xmlns:a16="http://schemas.microsoft.com/office/drawing/2014/main" id="{0A4D97CC-16A9-0386-5199-F52730468D48}"/>
+                </a:ext>
+              </a:extLst>
+            </p:cNvPr>
+            <p:cNvGrpSpPr/>
+            <p:nvPr/>
+          </p:nvGrpSpPr>
+          <p:grpSpPr>
+            <a:xfrm>
+              <a:off x="129788" y="6034455"/>
+              <a:ext cx="6000038" cy="1237843"/>
+              <a:chOff x="270885" y="2296926"/>
+              <a:chExt cx="6000038" cy="1237843"/>
+            </a:xfrm>
+          </p:grpSpPr>
+          <p:sp>
+            <p:nvSpPr>
+              <p:cNvPr id="74" name="Rectangle 73">
+                <a:extLst>
+                  <a:ext uri="{FF2B5EF4-FFF2-40B4-BE49-F238E27FC236}">
+                    <a16:creationId xmlns:a16="http://schemas.microsoft.com/office/drawing/2014/main" id="{3CC360F6-C536-C51E-8CAD-BB119C697ECB}"/>
+                  </a:ext>
+                </a:extLst>
+              </p:cNvPr>
+              <p:cNvSpPr/>
+              <p:nvPr/>
+            </p:nvSpPr>
+            <p:spPr>
+              <a:xfrm>
+                <a:off x="270885" y="2296926"/>
+                <a:ext cx="6000038" cy="1237843"/>
+              </a:xfrm>
+              <a:prstGeom prst="rect">
+                <a:avLst/>
+              </a:prstGeom>
+              <a:noFill/>
+            </p:spPr>
+            <p:style>
+              <a:lnRef idx="2">
+                <a:schemeClr val="accent1">
+                  <a:shade val="15000"/>
+                </a:schemeClr>
+              </a:lnRef>
+              <a:fillRef idx="1">
+                <a:schemeClr val="accent1"/>
+              </a:fillRef>
+              <a:effectRef idx="0">
+                <a:schemeClr val="accent1"/>
+              </a:effectRef>
+              <a:fontRef idx="minor">
+                <a:schemeClr val="lt1"/>
+              </a:fontRef>
+            </p:style>
+            <p:txBody>
+              <a:bodyPr rtlCol="0" anchor="ctr"/>
+              <a:lstStyle/>
+              <a:p>
+                <a:pPr algn="ctr"/>
+                <a:endParaRPr lang="ko-KR" altLang="en-US"/>
+              </a:p>
+            </p:txBody>
+          </p:sp>
+          <p:sp>
+            <p:nvSpPr>
+              <p:cNvPr id="75" name="TextBox 74">
+                <a:extLst>
+                  <a:ext uri="{FF2B5EF4-FFF2-40B4-BE49-F238E27FC236}">
+                    <a16:creationId xmlns:a16="http://schemas.microsoft.com/office/drawing/2014/main" id="{99C60E43-9B0C-429C-2538-2BFB90E53CDD}"/>
+                  </a:ext>
+                </a:extLst>
+              </p:cNvPr>
+              <p:cNvSpPr txBox="1"/>
+              <p:nvPr/>
+            </p:nvSpPr>
+            <p:spPr>
+              <a:xfrm>
+                <a:off x="406103" y="2352057"/>
+                <a:ext cx="766557" cy="369332"/>
+              </a:xfrm>
+              <a:prstGeom prst="rect">
+                <a:avLst/>
+              </a:prstGeom>
+              <a:noFill/>
+            </p:spPr>
+            <p:txBody>
+              <a:bodyPr wrap="none" rtlCol="0">
+                <a:spAutoFit/>
+              </a:bodyPr>
+              <a:lstStyle/>
+              <a:p>
+                <a:r>
+                  <a:rPr lang="en-US" altLang="ko-KR" b="1" dirty="0"/>
+                  <a:t>Bench</a:t>
+                </a:r>
+                <a:endParaRPr lang="ko-KR" altLang="en-US" b="1" dirty="0"/>
+              </a:p>
+            </p:txBody>
+          </p:sp>
+          <p:sp>
+            <p:nvSpPr>
+              <p:cNvPr id="76" name="TextBox 75">
+                <a:extLst>
+                  <a:ext uri="{FF2B5EF4-FFF2-40B4-BE49-F238E27FC236}">
+                    <a16:creationId xmlns:a16="http://schemas.microsoft.com/office/drawing/2014/main" id="{4732E2C5-1A01-4F84-13F6-1C382998560A}"/>
+                  </a:ext>
+                </a:extLst>
+              </p:cNvPr>
+              <p:cNvSpPr txBox="1"/>
+              <p:nvPr/>
+            </p:nvSpPr>
+            <p:spPr>
+              <a:xfrm>
+                <a:off x="406103" y="2621818"/>
+                <a:ext cx="2865400" cy="369332"/>
+              </a:xfrm>
+              <a:prstGeom prst="rect">
+                <a:avLst/>
+              </a:prstGeom>
+              <a:noFill/>
+            </p:spPr>
+            <p:txBody>
+              <a:bodyPr wrap="none" rtlCol="0">
+                <a:spAutoFit/>
+              </a:bodyPr>
+              <a:lstStyle/>
+              <a:p>
+                <a:r>
+                  <a:rPr lang="en-US" altLang="ko-KR" dirty="0">
+                    <a:solidFill>
+                      <a:schemeClr val="bg2">
+                        <a:lumMod val="75000"/>
+                      </a:schemeClr>
+                    </a:solidFill>
+                  </a:rPr>
+                  <a:t>Last exercise : 27 – 02 - 2001</a:t>
+                </a:r>
+                <a:endParaRPr lang="ko-KR" altLang="en-US" dirty="0">
+                  <a:solidFill>
+                    <a:schemeClr val="bg2">
+                      <a:lumMod val="75000"/>
+                    </a:schemeClr>
+                  </a:solidFill>
+                </a:endParaRPr>
+              </a:p>
+            </p:txBody>
+          </p:sp>
+          <p:sp>
+            <p:nvSpPr>
+              <p:cNvPr id="77" name="TextBox 76">
+                <a:extLst>
+                  <a:ext uri="{FF2B5EF4-FFF2-40B4-BE49-F238E27FC236}">
+                    <a16:creationId xmlns:a16="http://schemas.microsoft.com/office/drawing/2014/main" id="{E38176D9-A1AA-29A5-D692-47A106A42DA0}"/>
+                  </a:ext>
+                </a:extLst>
+              </p:cNvPr>
+              <p:cNvSpPr txBox="1"/>
+              <p:nvPr/>
+            </p:nvSpPr>
+            <p:spPr>
+              <a:xfrm>
+                <a:off x="437285" y="2947177"/>
+                <a:ext cx="1867819" cy="584775"/>
+              </a:xfrm>
+              <a:prstGeom prst="rect">
+                <a:avLst/>
+              </a:prstGeom>
+              <a:noFill/>
+            </p:spPr>
+            <p:txBody>
+              <a:bodyPr wrap="none" rtlCol="0">
+                <a:spAutoFit/>
+              </a:bodyPr>
+              <a:lstStyle/>
+              <a:p>
+                <a:r>
+                  <a:rPr lang="en-US" altLang="ko-KR" sz="1600" dirty="0">
+                    <a:latin typeface="Cascadia Mono" panose="020B0609020000020004" pitchFamily="49" charset="0"/>
+                    <a:cs typeface="Cascadia Mono" panose="020B0609020000020004" pitchFamily="49" charset="0"/>
+                  </a:rPr>
+                  <a:t>Main : chest</a:t>
+                </a:r>
+              </a:p>
+              <a:p>
+                <a:r>
+                  <a:rPr lang="en-US" altLang="ko-KR" sz="1600" dirty="0">
+                    <a:latin typeface="Cascadia Mono" panose="020B0609020000020004" pitchFamily="49" charset="0"/>
+                    <a:cs typeface="Cascadia Mono" panose="020B0609020000020004" pitchFamily="49" charset="0"/>
+                  </a:rPr>
+                  <a:t>Sub  : forearm</a:t>
+                </a:r>
+                <a:endParaRPr lang="ko-KR" altLang="en-US" sz="1600" dirty="0">
+                  <a:latin typeface="Cascadia Mono" panose="020B0609020000020004" pitchFamily="49" charset="0"/>
+                  <a:cs typeface="Cascadia Mono" panose="020B0609020000020004" pitchFamily="49" charset="0"/>
+                </a:endParaRPr>
+              </a:p>
+            </p:txBody>
+          </p:sp>
+          <p:sp>
+            <p:nvSpPr>
+              <p:cNvPr id="78" name="TextBox 77">
+                <a:extLst>
+                  <a:ext uri="{FF2B5EF4-FFF2-40B4-BE49-F238E27FC236}">
+                    <a16:creationId xmlns:a16="http://schemas.microsoft.com/office/drawing/2014/main" id="{ED45E677-FD2F-10BF-3AC9-36CF7667A797}"/>
+                  </a:ext>
+                </a:extLst>
+              </p:cNvPr>
+              <p:cNvSpPr txBox="1"/>
+              <p:nvPr/>
+            </p:nvSpPr>
+            <p:spPr>
+              <a:xfrm>
+                <a:off x="1172660" y="2342043"/>
+                <a:ext cx="1908408" cy="369332"/>
+              </a:xfrm>
+              <a:prstGeom prst="rect">
+                <a:avLst/>
+              </a:prstGeom>
+              <a:noFill/>
+            </p:spPr>
+            <p:txBody>
+              <a:bodyPr wrap="none" rtlCol="0">
+                <a:spAutoFit/>
+              </a:bodyPr>
+              <a:lstStyle/>
+              <a:p>
+                <a:r>
+                  <a:rPr lang="en-US" altLang="ko-KR" dirty="0">
+                    <a:solidFill>
+                      <a:schemeClr val="bg2">
+                        <a:lumMod val="75000"/>
+                      </a:schemeClr>
+                    </a:solidFill>
+                  </a:rPr>
+                  <a:t># push   # Monday</a:t>
+                </a:r>
+                <a:endParaRPr lang="ko-KR" altLang="en-US" dirty="0">
+                  <a:solidFill>
+                    <a:schemeClr val="bg2">
+                      <a:lumMod val="75000"/>
+                    </a:schemeClr>
+                  </a:solidFill>
+                </a:endParaRPr>
+              </a:p>
+            </p:txBody>
+          </p:sp>
+        </p:grpSp>
+        <p:sp>
+          <p:nvSpPr>
+            <p:cNvPr id="73" name="TextBox 72">
+              <a:extLst>
+                <a:ext uri="{FF2B5EF4-FFF2-40B4-BE49-F238E27FC236}">
+                  <a16:creationId xmlns:a16="http://schemas.microsoft.com/office/drawing/2014/main" id="{30D440B5-C1DA-8868-D3BA-00000E59BDA8}"/>
+                </a:ext>
+              </a:extLst>
+            </p:cNvPr>
+            <p:cNvSpPr txBox="1"/>
+            <p:nvPr/>
+          </p:nvSpPr>
+          <p:spPr>
+            <a:xfrm>
+              <a:off x="4399793" y="6034455"/>
+              <a:ext cx="1693028" cy="1200329"/>
+            </a:xfrm>
+            <a:prstGeom prst="rect">
+              <a:avLst/>
+            </a:prstGeom>
+            <a:noFill/>
+          </p:spPr>
+          <p:txBody>
+            <a:bodyPr wrap="none" rtlCol="0">
+              <a:spAutoFit/>
+            </a:bodyPr>
+            <a:lstStyle/>
+            <a:p>
+              <a:pPr algn="ctr"/>
+              <a:r>
+                <a:rPr lang="en-US" altLang="ko-KR" dirty="0"/>
+                <a:t>Personal Record</a:t>
+              </a:r>
+            </a:p>
+            <a:p>
+              <a:pPr algn="ctr"/>
+              <a:r>
+                <a:rPr lang="en-US" altLang="ko-KR" dirty="0"/>
+                <a:t>100 kg </a:t>
+              </a:r>
+            </a:p>
+            <a:p>
+              <a:pPr algn="ctr"/>
+              <a:r>
+                <a:rPr lang="en-US" altLang="ko-KR" dirty="0">
+                  <a:solidFill>
+                    <a:schemeClr val="bg2">
+                      <a:lumMod val="75000"/>
+                    </a:schemeClr>
+                  </a:solidFill>
+                </a:rPr>
+                <a:t>:27 – 02 - 2001</a:t>
+              </a:r>
+              <a:endParaRPr lang="en-US" altLang="ko-KR" dirty="0"/>
+            </a:p>
+            <a:p>
+              <a:pPr algn="ctr"/>
+              <a:r>
+                <a:rPr lang="en-US" altLang="ko-KR" dirty="0">
+                  <a:solidFill>
+                    <a:schemeClr val="bg2">
+                      <a:lumMod val="75000"/>
+                    </a:schemeClr>
+                  </a:solidFill>
+                </a:rPr>
+                <a:t>(4 days ago)</a:t>
+              </a:r>
+              <a:endParaRPr lang="ko-KR" altLang="en-US" dirty="0">
+                <a:solidFill>
+                  <a:schemeClr val="bg2">
+                    <a:lumMod val="75000"/>
+                  </a:schemeClr>
+                </a:solidFill>
+              </a:endParaRPr>
+            </a:p>
+          </p:txBody>
+        </p:sp>
+      </p:grpSp>
+    </p:spTree>
+    <p:extLst>
+      <p:ext uri="{BB962C8B-B14F-4D97-AF65-F5344CB8AC3E}">
+        <p14:creationId xmlns:p14="http://schemas.microsoft.com/office/powerpoint/2010/main" val="4284400445"/>
+      </p:ext>
+    </p:extLst>
+  </p:cSld>
+  <p:clrMapOvr>
+    <a:masterClrMapping/>
+  </p:clrMapOvr>
+  <p:extLst>
+    <p:ext uri="{6950BFC3-D8DA-4A85-94F7-54DA5524770B}">
+      <p188:commentRel xmlns:p188="http://schemas.microsoft.com/office/powerpoint/2018/8/main" r:id="rId2"/>
+    </p:ext>
+  </p:extLst>
+</p:sld>
+</file>
+
+<file path=ppt/slides/slide4.xml><?xml version="1.0" encoding="utf-8"?>
+<p:sld xmlns:a="http://schemas.openxmlformats.org/drawingml/2006/main" xmlns:r="http://schemas.openxmlformats.org/officeDocument/2006/relationships" xmlns:p="http://schemas.openxmlformats.org/presentationml/2006/main">
+  <p:cSld>
+    <p:spTree>
+      <p:nvGrpSpPr>
+        <p:cNvPr id="1" name=""/>
+        <p:cNvGrpSpPr/>
+        <p:nvPr/>
+      </p:nvGrpSpPr>
+      <p:grpSpPr>
+        <a:xfrm>
+          <a:off x="0" y="0"/>
+          <a:ext cx="0" cy="0"/>
+          <a:chOff x="0" y="0"/>
+          <a:chExt cx="0" cy="0"/>
+        </a:xfrm>
+      </p:grpSpPr>
+      <p:sp>
+        <p:nvSpPr>
+          <p:cNvPr id="5" name="Rectangle 4">
+            <a:extLst>
+              <a:ext uri="{FF2B5EF4-FFF2-40B4-BE49-F238E27FC236}">
+                <a16:creationId xmlns:a16="http://schemas.microsoft.com/office/drawing/2014/main" id="{38C16829-798A-B1FA-6420-F068D5210254}"/>
+              </a:ext>
+            </a:extLst>
+          </p:cNvPr>
+          <p:cNvSpPr/>
+          <p:nvPr/>
+        </p:nvSpPr>
+        <p:spPr>
+          <a:xfrm>
+            <a:off x="0" y="0"/>
+            <a:ext cx="6732588" cy="586854"/>
+          </a:xfrm>
+          <a:prstGeom prst="rect">
+            <a:avLst/>
+          </a:prstGeom>
+          <a:noFill/>
+        </p:spPr>
+        <p:style>
+          <a:lnRef idx="2">
+            <a:schemeClr val="accent1">
+              <a:shade val="15000"/>
+            </a:schemeClr>
+          </a:lnRef>
+          <a:fillRef idx="1">
+            <a:schemeClr val="accent1"/>
+          </a:fillRef>
+          <a:effectRef idx="0">
+            <a:schemeClr val="accent1"/>
+          </a:effectRef>
+          <a:fontRef idx="minor">
+            <a:schemeClr val="lt1"/>
+          </a:fontRef>
+        </p:style>
+        <p:txBody>
+          <a:bodyPr rtlCol="0" anchor="ctr"/>
+          <a:lstStyle/>
+          <a:p>
+            <a:pPr algn="ctr"/>
+            <a:r>
+              <a:rPr lang="en-US" altLang="ko-KR" dirty="0"/>
+              <a:t>`</a:t>
+            </a:r>
+            <a:endParaRPr lang="ko-KR" altLang="en-US" dirty="0"/>
+          </a:p>
+        </p:txBody>
+      </p:sp>
+      <p:sp>
+        <p:nvSpPr>
+          <p:cNvPr id="6" name="TextBox 5">
+            <a:extLst>
+              <a:ext uri="{FF2B5EF4-FFF2-40B4-BE49-F238E27FC236}">
+                <a16:creationId xmlns:a16="http://schemas.microsoft.com/office/drawing/2014/main" id="{0EC09F9F-37DB-AB06-7540-8141473A97BD}"/>
+              </a:ext>
+            </a:extLst>
+          </p:cNvPr>
+          <p:cNvSpPr txBox="1"/>
+          <p:nvPr/>
+        </p:nvSpPr>
+        <p:spPr>
+          <a:xfrm>
+            <a:off x="270885" y="149719"/>
+            <a:ext cx="1040670" cy="369332"/>
+          </a:xfrm>
+          <a:prstGeom prst="rect">
+            <a:avLst/>
+          </a:prstGeom>
+          <a:noFill/>
+        </p:spPr>
+        <p:txBody>
+          <a:bodyPr wrap="none" rtlCol="0">
+            <a:spAutoFit/>
+          </a:bodyPr>
+          <a:lstStyle/>
+          <a:p>
+            <a:r>
+              <a:rPr lang="en-US" altLang="ko-KR" dirty="0"/>
+              <a:t>&lt;   Bench</a:t>
+            </a:r>
+          </a:p>
+        </p:txBody>
+      </p:sp>
+      <p:sp>
+        <p:nvSpPr>
+          <p:cNvPr id="19" name="Rectangle 18">
+            <a:extLst>
+              <a:ext uri="{FF2B5EF4-FFF2-40B4-BE49-F238E27FC236}">
+                <a16:creationId xmlns:a16="http://schemas.microsoft.com/office/drawing/2014/main" id="{3A716BEA-4598-7A00-7C14-3863602539BD}"/>
+              </a:ext>
+            </a:extLst>
+          </p:cNvPr>
+          <p:cNvSpPr/>
+          <p:nvPr/>
+        </p:nvSpPr>
+        <p:spPr>
+          <a:xfrm>
+            <a:off x="355587" y="9071704"/>
+            <a:ext cx="2272352" cy="350520"/>
+          </a:xfrm>
+          <a:prstGeom prst="rect">
+            <a:avLst/>
+          </a:prstGeom>
+          <a:solidFill>
+            <a:schemeClr val="bg1"/>
+          </a:solidFill>
+        </p:spPr>
+        <p:style>
+          <a:lnRef idx="2">
+            <a:schemeClr val="accent1">
+              <a:shade val="15000"/>
+            </a:schemeClr>
+          </a:lnRef>
+          <a:fillRef idx="1">
+            <a:schemeClr val="accent1"/>
+          </a:fillRef>
+          <a:effectRef idx="0">
+            <a:schemeClr val="accent1"/>
+          </a:effectRef>
+          <a:fontRef idx="minor">
+            <a:schemeClr val="lt1"/>
+          </a:fontRef>
+        </p:style>
+        <p:txBody>
+          <a:bodyPr rtlCol="0" anchor="ctr"/>
+          <a:lstStyle/>
+          <a:p>
+            <a:pPr algn="ctr"/>
+            <a:endParaRPr lang="ko-KR" altLang="en-US"/>
+          </a:p>
+        </p:txBody>
+      </p:sp>
+      <p:sp>
+        <p:nvSpPr>
+          <p:cNvPr id="20" name="Rectangle 19">
+            <a:extLst>
+              <a:ext uri="{FF2B5EF4-FFF2-40B4-BE49-F238E27FC236}">
+                <a16:creationId xmlns:a16="http://schemas.microsoft.com/office/drawing/2014/main" id="{D7D5AB45-CA8E-E037-75FA-5AA88AB5518C}"/>
+              </a:ext>
+            </a:extLst>
+          </p:cNvPr>
+          <p:cNvSpPr/>
+          <p:nvPr/>
+        </p:nvSpPr>
+        <p:spPr>
+          <a:xfrm>
+            <a:off x="355587" y="9492619"/>
+            <a:ext cx="2272352" cy="350520"/>
+          </a:xfrm>
+          <a:prstGeom prst="rect">
+            <a:avLst/>
+          </a:prstGeom>
+          <a:solidFill>
+            <a:schemeClr val="bg1"/>
+          </a:solidFill>
+        </p:spPr>
+        <p:style>
+          <a:lnRef idx="2">
+            <a:schemeClr val="accent1">
+              <a:shade val="15000"/>
+            </a:schemeClr>
+          </a:lnRef>
+          <a:fillRef idx="1">
+            <a:schemeClr val="accent1"/>
+          </a:fillRef>
+          <a:effectRef idx="0">
+            <a:schemeClr val="accent1"/>
+          </a:effectRef>
+          <a:fontRef idx="minor">
+            <a:schemeClr val="lt1"/>
+          </a:fontRef>
+        </p:style>
+        <p:txBody>
+          <a:bodyPr rtlCol="0" anchor="ctr"/>
+          <a:lstStyle/>
+          <a:p>
+            <a:pPr algn="ctr"/>
+            <a:endParaRPr lang="ko-KR" altLang="en-US"/>
+          </a:p>
+        </p:txBody>
+      </p:sp>
+      <p:sp>
+        <p:nvSpPr>
+          <p:cNvPr id="21" name="TextBox 20">
+            <a:extLst>
+              <a:ext uri="{FF2B5EF4-FFF2-40B4-BE49-F238E27FC236}">
+                <a16:creationId xmlns:a16="http://schemas.microsoft.com/office/drawing/2014/main" id="{6BDA41C4-B137-00C3-0A7E-DC2CBD6E9323}"/>
+              </a:ext>
+            </a:extLst>
+          </p:cNvPr>
+          <p:cNvSpPr txBox="1"/>
+          <p:nvPr/>
+        </p:nvSpPr>
+        <p:spPr>
+          <a:xfrm>
+            <a:off x="2725791" y="9050987"/>
+            <a:ext cx="413896" cy="369332"/>
+          </a:xfrm>
+          <a:prstGeom prst="rect">
+            <a:avLst/>
+          </a:prstGeom>
+          <a:noFill/>
+        </p:spPr>
+        <p:txBody>
+          <a:bodyPr wrap="none" rtlCol="0">
+            <a:spAutoFit/>
+          </a:bodyPr>
+          <a:lstStyle/>
+          <a:p>
+            <a:r>
+              <a:rPr lang="en-US" altLang="ko-KR" dirty="0"/>
+              <a:t>Kg</a:t>
+            </a:r>
+          </a:p>
+        </p:txBody>
+      </p:sp>
+      <p:sp>
+        <p:nvSpPr>
+          <p:cNvPr id="22" name="TextBox 21">
+            <a:extLst>
+              <a:ext uri="{FF2B5EF4-FFF2-40B4-BE49-F238E27FC236}">
+                <a16:creationId xmlns:a16="http://schemas.microsoft.com/office/drawing/2014/main" id="{57A80F8D-66F8-BA76-7D2A-53B045D52A1C}"/>
+              </a:ext>
+            </a:extLst>
+          </p:cNvPr>
+          <p:cNvSpPr txBox="1"/>
+          <p:nvPr/>
+        </p:nvSpPr>
+        <p:spPr>
+          <a:xfrm>
+            <a:off x="2734774" y="9452158"/>
+            <a:ext cx="631520" cy="369332"/>
+          </a:xfrm>
+          <a:prstGeom prst="rect">
+            <a:avLst/>
+          </a:prstGeom>
+          <a:noFill/>
+        </p:spPr>
+        <p:txBody>
+          <a:bodyPr wrap="none" rtlCol="0">
+            <a:spAutoFit/>
+          </a:bodyPr>
+          <a:lstStyle/>
+          <a:p>
+            <a:r>
+              <a:rPr lang="en-US" altLang="ko-KR" dirty="0"/>
+              <a:t>Reps</a:t>
+            </a:r>
+          </a:p>
+        </p:txBody>
+      </p:sp>
+      <p:sp>
+        <p:nvSpPr>
+          <p:cNvPr id="23" name="Rectangle: Rounded Corners 22">
+            <a:extLst>
+              <a:ext uri="{FF2B5EF4-FFF2-40B4-BE49-F238E27FC236}">
+                <a16:creationId xmlns:a16="http://schemas.microsoft.com/office/drawing/2014/main" id="{F9DB3C25-5456-C30C-E36B-02820F9C831A}"/>
+              </a:ext>
+            </a:extLst>
+          </p:cNvPr>
+          <p:cNvSpPr/>
+          <p:nvPr/>
+        </p:nvSpPr>
+        <p:spPr>
+          <a:xfrm>
+            <a:off x="3592903" y="9420319"/>
+            <a:ext cx="2784098" cy="401171"/>
+          </a:xfrm>
+          <a:prstGeom prst="roundRect">
+            <a:avLst/>
+          </a:prstGeom>
+          <a:solidFill>
+            <a:srgbClr val="E4D377"/>
+          </a:solidFill>
+        </p:spPr>
+        <p:style>
+          <a:lnRef idx="2">
+            <a:schemeClr val="accent1">
+              <a:shade val="15000"/>
+            </a:schemeClr>
+          </a:lnRef>
+          <a:fillRef idx="1">
+            <a:schemeClr val="accent1"/>
+          </a:fillRef>
+          <a:effectRef idx="0">
+            <a:schemeClr val="accent1"/>
+          </a:effectRef>
+          <a:fontRef idx="minor">
+            <a:schemeClr val="lt1"/>
+          </a:fontRef>
+        </p:style>
+        <p:txBody>
+          <a:bodyPr rtlCol="0" anchor="ctr"/>
+          <a:lstStyle/>
+          <a:p>
+            <a:pPr algn="ctr"/>
+            <a:r>
+              <a:rPr lang="en-US" altLang="ko-KR" b="1" dirty="0">
+                <a:solidFill>
+                  <a:schemeClr val="bg1"/>
+                </a:solidFill>
+              </a:rPr>
               <a:t>LOG</a:t>
             </a:r>
-            <a:endParaRPr lang="ko-KR" altLang="en-US" b="1" dirty="0"/>
+            <a:endParaRPr lang="ko-KR" altLang="en-US" b="1" dirty="0">
+              <a:solidFill>
+                <a:schemeClr val="bg1"/>
+              </a:solidFill>
+            </a:endParaRPr>
           </a:p>
         </p:txBody>
       </p:sp>
@@ -8766,7 +10629,7 @@
           <p:nvPr>
             <p:extLst>
               <p:ext uri="{D42A27DB-BD31-4B8C-83A1-F6EECF244321}">
-                <p14:modId xmlns:p14="http://schemas.microsoft.com/office/powerpoint/2010/main" val="1466554025"/>
+                <p14:modId xmlns:p14="http://schemas.microsoft.com/office/powerpoint/2010/main" val="2350191735"/>
               </p:ext>
             </p:extLst>
           </p:nvPr>
@@ -8805,13 +10668,25 @@
                     <a:p>
                       <a:pPr algn="l" latinLnBrk="1"/>
                       <a:r>
-                        <a:rPr lang="en-US" altLang="ko-KR" sz="1800" dirty="0"/>
+                        <a:rPr lang="en-US" altLang="ko-KR" sz="1800" dirty="0">
+                          <a:solidFill>
+                            <a:schemeClr val="bg1"/>
+                          </a:solidFill>
+                        </a:rPr>
                         <a:t>TODAY</a:t>
                       </a:r>
-                      <a:endParaRPr lang="ko-KR" altLang="en-US" sz="1800" dirty="0"/>
+                      <a:endParaRPr lang="ko-KR" altLang="en-US" sz="1800" dirty="0">
+                        <a:solidFill>
+                          <a:schemeClr val="bg1"/>
+                        </a:solidFill>
+                      </a:endParaRPr>
                     </a:p>
                   </a:txBody>
-                  <a:tcPr/>
+                  <a:tcPr>
+                    <a:solidFill>
+                      <a:srgbClr val="E4D377"/>
+                    </a:solidFill>
+                  </a:tcPr>
                 </a:tc>
                 <a:tc hMerge="1">
                   <a:txBody>
@@ -10015,6 +11890,9 @@
             <a:chOff x="270885" y="736574"/>
             <a:chExt cx="2977282" cy="1419774"/>
           </a:xfrm>
+          <a:solidFill>
+            <a:srgbClr val="5F63BE"/>
+          </a:solidFill>
         </p:grpSpPr>
         <p:sp>
           <p:nvSpPr>
@@ -10036,9 +11914,7 @@
             <a:prstGeom prst="roundRect">
               <a:avLst/>
             </a:prstGeom>
-            <a:solidFill>
-              <a:srgbClr val="952613"/>
-            </a:solidFill>
+            <a:grpFill/>
             <a:ln>
               <a:noFill/>
             </a:ln>
@@ -10088,7 +11964,7 @@
             <a:prstGeom prst="rect">
               <a:avLst/>
             </a:prstGeom>
-            <a:noFill/>
+            <a:grpFill/>
           </p:spPr>
           <p:txBody>
             <a:bodyPr wrap="none" rtlCol="0">
@@ -10128,7 +12004,7 @@
           <p:nvPr>
             <p:extLst>
               <p:ext uri="{D42A27DB-BD31-4B8C-83A1-F6EECF244321}">
-                <p14:modId xmlns:p14="http://schemas.microsoft.com/office/powerpoint/2010/main" val="2899111263"/>
+                <p14:modId xmlns:p14="http://schemas.microsoft.com/office/powerpoint/2010/main" val="3579096781"/>
               </p:ext>
             </p:extLst>
           </p:nvPr>
@@ -10167,12 +12043,20 @@
                     <a:p>
                       <a:pPr algn="ctr" latinLnBrk="1"/>
                       <a:r>
-                        <a:rPr lang="en-US" altLang="ko-KR" sz="1800" dirty="0"/>
+                        <a:rPr lang="en-US" altLang="ko-KR" sz="1800" dirty="0">
+                          <a:solidFill>
+                            <a:schemeClr val="bg1"/>
+                          </a:solidFill>
+                        </a:rPr>
                         <a:t>Set 2</a:t>
                       </a:r>
                     </a:p>
                   </a:txBody>
-                  <a:tcPr/>
+                  <a:tcPr>
+                    <a:solidFill>
+                      <a:srgbClr val="E4D377"/>
+                    </a:solidFill>
+                  </a:tcPr>
                 </a:tc>
                 <a:tc>
                   <a:txBody>
@@ -10181,13 +12065,25 @@
                     <a:p>
                       <a:pPr algn="ctr" latinLnBrk="1"/>
                       <a:r>
-                        <a:rPr lang="en-US" altLang="ko-KR" sz="1800" dirty="0"/>
+                        <a:rPr lang="en-US" altLang="ko-KR" sz="1800" dirty="0">
+                          <a:solidFill>
+                            <a:schemeClr val="bg1"/>
+                          </a:solidFill>
+                        </a:rPr>
                         <a:t>12 kg * 5</a:t>
                       </a:r>
-                      <a:endParaRPr lang="ko-KR" altLang="en-US" sz="1800" dirty="0"/>
+                      <a:endParaRPr lang="ko-KR" altLang="en-US" sz="1800" dirty="0">
+                        <a:solidFill>
+                          <a:schemeClr val="bg1"/>
+                        </a:solidFill>
+                      </a:endParaRPr>
                     </a:p>
                   </a:txBody>
-                  <a:tcPr/>
+                  <a:tcPr>
+                    <a:solidFill>
+                      <a:srgbClr val="E4D377"/>
+                    </a:solidFill>
+                  </a:tcPr>
                 </a:tc>
                 <a:extLst>
                   <a:ext uri="{0D108BD9-81ED-4DB2-BD59-A6C34878D82A}">
@@ -10285,7 +12181,7 @@
               <a:avLst/>
             </a:prstGeom>
             <a:solidFill>
-              <a:srgbClr val="952613"/>
+              <a:srgbClr val="5F63BE"/>
             </a:solidFill>
             <a:ln>
               <a:noFill/>
@@ -10423,7 +12319,7 @@
           <p:nvPr>
             <p:extLst>
               <p:ext uri="{D42A27DB-BD31-4B8C-83A1-F6EECF244321}">
-                <p14:modId xmlns:p14="http://schemas.microsoft.com/office/powerpoint/2010/main" val="3107995944"/>
+                <p14:modId xmlns:p14="http://schemas.microsoft.com/office/powerpoint/2010/main" val="713023435"/>
               </p:ext>
             </p:extLst>
           </p:nvPr>
@@ -10451,7 +12347,7 @@
           <p:nvPr>
             <p:extLst>
               <p:ext uri="{D42A27DB-BD31-4B8C-83A1-F6EECF244321}">
-                <p14:modId xmlns:p14="http://schemas.microsoft.com/office/powerpoint/2010/main" val="2994152377"/>
+                <p14:modId xmlns:p14="http://schemas.microsoft.com/office/powerpoint/2010/main" val="437259851"/>
               </p:ext>
             </p:extLst>
           </p:nvPr>
@@ -11370,6 +13266,36 @@
           </a:graphicData>
         </a:graphic>
       </p:graphicFrame>
+      <p:pic>
+        <p:nvPicPr>
+          <p:cNvPr id="7" name="Picture 6" descr="A couple of figures of people&#10;&#10;Description automatically generated with medium confidence">
+            <a:extLst>
+              <a:ext uri="{FF2B5EF4-FFF2-40B4-BE49-F238E27FC236}">
+                <a16:creationId xmlns:a16="http://schemas.microsoft.com/office/drawing/2014/main" id="{075DDF83-FDD2-E902-F300-32F850DDCCA0}"/>
+              </a:ext>
+            </a:extLst>
+          </p:cNvPr>
+          <p:cNvPicPr>
+            <a:picLocks noChangeAspect="1"/>
+          </p:cNvPicPr>
+          <p:nvPr/>
+        </p:nvPicPr>
+        <p:blipFill>
+          <a:blip r:embed="rId5"/>
+          <a:stretch>
+            <a:fillRect/>
+          </a:stretch>
+        </p:blipFill>
+        <p:spPr>
+          <a:xfrm>
+            <a:off x="7176520" y="4360733"/>
+            <a:ext cx="5235021" cy="4707041"/>
+          </a:xfrm>
+          <a:prstGeom prst="rect">
+            <a:avLst/>
+          </a:prstGeom>
+        </p:spPr>
+      </p:pic>
     </p:spTree>
     <p:extLst>
       <p:ext uri="{BB962C8B-B14F-4D97-AF65-F5344CB8AC3E}">
@@ -11388,7 +13314,7 @@
 </p:sld>
 </file>
 
-<file path=ppt/slides/slide4.xml><?xml version="1.0" encoding="utf-8"?>
+<file path=ppt/slides/slide5.xml><?xml version="1.0" encoding="utf-8"?>
 <p:sld xmlns:a="http://schemas.openxmlformats.org/drawingml/2006/main" xmlns:r="http://schemas.openxmlformats.org/officeDocument/2006/relationships" xmlns:p="http://schemas.openxmlformats.org/presentationml/2006/main">
   <p:cSld>
     <p:spTree>
@@ -11909,7 +13835,7 @@
             <a:avLst/>
           </a:prstGeom>
           <a:solidFill>
-            <a:srgbClr val="952613"/>
+            <a:srgbClr val="E4D377"/>
           </a:solidFill>
         </p:spPr>
         <p:style>
@@ -13794,7 +15720,7 @@
 </p:sld>
 </file>
 
-<file path=ppt/slides/slide5.xml><?xml version="1.0" encoding="utf-8"?>
+<file path=ppt/slides/slide6.xml><?xml version="1.0" encoding="utf-8"?>
 <p:sld xmlns:a="http://schemas.openxmlformats.org/drawingml/2006/main" xmlns:r="http://schemas.openxmlformats.org/officeDocument/2006/relationships" xmlns:p="http://schemas.openxmlformats.org/presentationml/2006/main">
   <p:cSld>
     <p:spTree>
@@ -14159,6 +16085,9 @@
           <a:prstGeom prst="rect">
             <a:avLst/>
           </a:prstGeom>
+          <a:solidFill>
+            <a:srgbClr val="5F63BE"/>
+          </a:solidFill>
           <a:ln>
             <a:solidFill>
               <a:schemeClr val="tx1"/>
@@ -14185,7 +16114,11 @@
           <a:p>
             <a:pPr algn="ctr"/>
             <a:r>
-              <a:rPr lang="en-US" altLang="ko-KR" dirty="0"/>
+              <a:rPr lang="en-US" altLang="ko-KR" b="1" dirty="0">
+                <a:solidFill>
+                  <a:schemeClr val="bg1"/>
+                </a:solidFill>
+              </a:rPr>
               <a:t>App Version</a:t>
             </a:r>
           </a:p>
@@ -14211,6 +16144,9 @@
           <a:prstGeom prst="rect">
             <a:avLst/>
           </a:prstGeom>
+          <a:solidFill>
+            <a:srgbClr val="5F63BE"/>
+          </a:solidFill>
           <a:ln>
             <a:solidFill>
               <a:schemeClr val="tx1"/>
@@ -14237,7 +16173,11 @@
           <a:p>
             <a:pPr algn="ctr"/>
             <a:r>
-              <a:rPr lang="en-US" altLang="ko-KR" dirty="0"/>
+              <a:rPr lang="en-US" altLang="ko-KR" b="1" dirty="0">
+                <a:solidFill>
+                  <a:schemeClr val="bg1"/>
+                </a:solidFill>
+              </a:rPr>
               <a:t>Send Feedback</a:t>
             </a:r>
           </a:p>
@@ -14263,6 +16203,9 @@
           <a:prstGeom prst="rect">
             <a:avLst/>
           </a:prstGeom>
+          <a:solidFill>
+            <a:srgbClr val="5F63BE"/>
+          </a:solidFill>
           <a:ln>
             <a:solidFill>
               <a:schemeClr val="tx1"/>
@@ -14289,7 +16232,11 @@
           <a:p>
             <a:pPr algn="ctr"/>
             <a:r>
-              <a:rPr lang="en-US" altLang="ko-KR" dirty="0"/>
+              <a:rPr lang="en-US" altLang="ko-KR" b="1" dirty="0">
+                <a:solidFill>
+                  <a:schemeClr val="bg1"/>
+                </a:solidFill>
+              </a:rPr>
               <a:t>Privacy Policy</a:t>
             </a:r>
           </a:p>
@@ -14315,6 +16262,9 @@
           <a:prstGeom prst="rect">
             <a:avLst/>
           </a:prstGeom>
+          <a:solidFill>
+            <a:srgbClr val="5F63BE"/>
+          </a:solidFill>
           <a:ln>
             <a:solidFill>
               <a:schemeClr val="tx1"/>
@@ -14341,7 +16291,11 @@
           <a:p>
             <a:pPr algn="ctr"/>
             <a:r>
-              <a:rPr lang="en-US" altLang="ko-KR" dirty="0"/>
+              <a:rPr lang="en-US" altLang="ko-KR" b="1" dirty="0">
+                <a:solidFill>
+                  <a:schemeClr val="bg1"/>
+                </a:solidFill>
+              </a:rPr>
               <a:t>Personal Information</a:t>
             </a:r>
           </a:p>
@@ -14360,7 +16314,7 @@
 </p:sld>
 </file>
 
-<file path=ppt/slides/slide6.xml><?xml version="1.0" encoding="utf-8"?>
+<file path=ppt/slides/slide7.xml><?xml version="1.0" encoding="utf-8"?>
 <p:sld xmlns:a="http://schemas.openxmlformats.org/drawingml/2006/main" xmlns:r="http://schemas.openxmlformats.org/officeDocument/2006/relationships" xmlns:p="http://schemas.openxmlformats.org/presentationml/2006/main">
   <p:cSld>
     <p:spTree>
@@ -14803,401 +16757,6 @@
 </p:sld>
 </file>
 
-<file path=ppt/slides/slide7.xml><?xml version="1.0" encoding="utf-8"?>
-<p:sld xmlns:a="http://schemas.openxmlformats.org/drawingml/2006/main" xmlns:r="http://schemas.openxmlformats.org/officeDocument/2006/relationships" xmlns:p="http://schemas.openxmlformats.org/presentationml/2006/main">
-  <p:cSld>
-    <p:spTree>
-      <p:nvGrpSpPr>
-        <p:cNvPr id="1" name=""/>
-        <p:cNvGrpSpPr/>
-        <p:nvPr/>
-      </p:nvGrpSpPr>
-      <p:grpSpPr>
-        <a:xfrm>
-          <a:off x="0" y="0"/>
-          <a:ext cx="0" cy="0"/>
-          <a:chOff x="0" y="0"/>
-          <a:chExt cx="0" cy="0"/>
-        </a:xfrm>
-      </p:grpSpPr>
-      <p:sp>
-        <p:nvSpPr>
-          <p:cNvPr id="4" name="Rectangle 3">
-            <a:extLst>
-              <a:ext uri="{FF2B5EF4-FFF2-40B4-BE49-F238E27FC236}">
-                <a16:creationId xmlns:a16="http://schemas.microsoft.com/office/drawing/2014/main" id="{7618E36C-9D8B-55D8-DCA1-B598E9C7E19F}"/>
-              </a:ext>
-            </a:extLst>
-          </p:cNvPr>
-          <p:cNvSpPr/>
-          <p:nvPr/>
-        </p:nvSpPr>
-        <p:spPr>
-          <a:xfrm>
-            <a:off x="0" y="9430602"/>
-            <a:ext cx="2174236" cy="684947"/>
-          </a:xfrm>
-          <a:prstGeom prst="rect">
-            <a:avLst/>
-          </a:prstGeom>
-          <a:noFill/>
-        </p:spPr>
-        <p:style>
-          <a:lnRef idx="2">
-            <a:schemeClr val="accent1">
-              <a:shade val="15000"/>
-            </a:schemeClr>
-          </a:lnRef>
-          <a:fillRef idx="1">
-            <a:schemeClr val="accent1"/>
-          </a:fillRef>
-          <a:effectRef idx="0">
-            <a:schemeClr val="accent1"/>
-          </a:effectRef>
-          <a:fontRef idx="minor">
-            <a:schemeClr val="lt1"/>
-          </a:fontRef>
-        </p:style>
-        <p:txBody>
-          <a:bodyPr rtlCol="0" anchor="ctr"/>
-          <a:lstStyle/>
-          <a:p>
-            <a:pPr algn="ctr"/>
-            <a:endParaRPr lang="ko-KR" altLang="en-US"/>
-          </a:p>
-        </p:txBody>
-      </p:sp>
-      <p:sp>
-        <p:nvSpPr>
-          <p:cNvPr id="5" name="Rectangle 4">
-            <a:extLst>
-              <a:ext uri="{FF2B5EF4-FFF2-40B4-BE49-F238E27FC236}">
-                <a16:creationId xmlns:a16="http://schemas.microsoft.com/office/drawing/2014/main" id="{9C3BA55D-E5F8-48B8-DAF6-24831D1EE7F4}"/>
-              </a:ext>
-            </a:extLst>
-          </p:cNvPr>
-          <p:cNvSpPr/>
-          <p:nvPr/>
-        </p:nvSpPr>
-        <p:spPr>
-          <a:xfrm>
-            <a:off x="2174236" y="9430602"/>
-            <a:ext cx="2384116" cy="684947"/>
-          </a:xfrm>
-          <a:prstGeom prst="rect">
-            <a:avLst/>
-          </a:prstGeom>
-          <a:noFill/>
-        </p:spPr>
-        <p:style>
-          <a:lnRef idx="2">
-            <a:schemeClr val="accent1">
-              <a:shade val="15000"/>
-            </a:schemeClr>
-          </a:lnRef>
-          <a:fillRef idx="1">
-            <a:schemeClr val="accent1"/>
-          </a:fillRef>
-          <a:effectRef idx="0">
-            <a:schemeClr val="accent1"/>
-          </a:effectRef>
-          <a:fontRef idx="minor">
-            <a:schemeClr val="lt1"/>
-          </a:fontRef>
-        </p:style>
-        <p:txBody>
-          <a:bodyPr rtlCol="0" anchor="ctr"/>
-          <a:lstStyle/>
-          <a:p>
-            <a:pPr algn="ctr"/>
-            <a:endParaRPr lang="ko-KR" altLang="en-US"/>
-          </a:p>
-        </p:txBody>
-      </p:sp>
-      <p:sp>
-        <p:nvSpPr>
-          <p:cNvPr id="6" name="Rectangle 5">
-            <a:extLst>
-              <a:ext uri="{FF2B5EF4-FFF2-40B4-BE49-F238E27FC236}">
-                <a16:creationId xmlns:a16="http://schemas.microsoft.com/office/drawing/2014/main" id="{7DE37287-A826-004C-4743-526EB9583781}"/>
-              </a:ext>
-            </a:extLst>
-          </p:cNvPr>
-          <p:cNvSpPr/>
-          <p:nvPr/>
-        </p:nvSpPr>
-        <p:spPr>
-          <a:xfrm>
-            <a:off x="4558352" y="9430602"/>
-            <a:ext cx="2174236" cy="684947"/>
-          </a:xfrm>
-          <a:prstGeom prst="rect">
-            <a:avLst/>
-          </a:prstGeom>
-          <a:noFill/>
-        </p:spPr>
-        <p:style>
-          <a:lnRef idx="2">
-            <a:schemeClr val="accent1">
-              <a:shade val="15000"/>
-            </a:schemeClr>
-          </a:lnRef>
-          <a:fillRef idx="1">
-            <a:schemeClr val="accent1"/>
-          </a:fillRef>
-          <a:effectRef idx="0">
-            <a:schemeClr val="accent1"/>
-          </a:effectRef>
-          <a:fontRef idx="minor">
-            <a:schemeClr val="lt1"/>
-          </a:fontRef>
-        </p:style>
-        <p:txBody>
-          <a:bodyPr rtlCol="0" anchor="ctr"/>
-          <a:lstStyle/>
-          <a:p>
-            <a:pPr algn="ctr"/>
-            <a:endParaRPr lang="ko-KR" altLang="en-US"/>
-          </a:p>
-        </p:txBody>
-      </p:sp>
-      <p:sp>
-        <p:nvSpPr>
-          <p:cNvPr id="7" name="Rectangle 6">
-            <a:extLst>
-              <a:ext uri="{FF2B5EF4-FFF2-40B4-BE49-F238E27FC236}">
-                <a16:creationId xmlns:a16="http://schemas.microsoft.com/office/drawing/2014/main" id="{63023936-5EB5-6DCB-C43D-D3CFC72FC7A1}"/>
-              </a:ext>
-            </a:extLst>
-          </p:cNvPr>
-          <p:cNvSpPr/>
-          <p:nvPr/>
-        </p:nvSpPr>
-        <p:spPr>
-          <a:xfrm>
-            <a:off x="0" y="0"/>
-            <a:ext cx="6732588" cy="586854"/>
-          </a:xfrm>
-          <a:prstGeom prst="rect">
-            <a:avLst/>
-          </a:prstGeom>
-          <a:noFill/>
-        </p:spPr>
-        <p:style>
-          <a:lnRef idx="2">
-            <a:schemeClr val="accent1">
-              <a:shade val="15000"/>
-            </a:schemeClr>
-          </a:lnRef>
-          <a:fillRef idx="1">
-            <a:schemeClr val="accent1"/>
-          </a:fillRef>
-          <a:effectRef idx="0">
-            <a:schemeClr val="accent1"/>
-          </a:effectRef>
-          <a:fontRef idx="minor">
-            <a:schemeClr val="lt1"/>
-          </a:fontRef>
-        </p:style>
-        <p:txBody>
-          <a:bodyPr rtlCol="0" anchor="ctr"/>
-          <a:lstStyle/>
-          <a:p>
-            <a:pPr algn="ctr"/>
-            <a:endParaRPr lang="ko-KR" altLang="en-US" dirty="0"/>
-          </a:p>
-        </p:txBody>
-      </p:sp>
-      <p:sp>
-        <p:nvSpPr>
-          <p:cNvPr id="8" name="TextBox 7">
-            <a:extLst>
-              <a:ext uri="{FF2B5EF4-FFF2-40B4-BE49-F238E27FC236}">
-                <a16:creationId xmlns:a16="http://schemas.microsoft.com/office/drawing/2014/main" id="{3AB4BDF4-175C-7077-9C6D-B9E1CBB1D426}"/>
-              </a:ext>
-            </a:extLst>
-          </p:cNvPr>
-          <p:cNvSpPr txBox="1"/>
-          <p:nvPr/>
-        </p:nvSpPr>
-        <p:spPr>
-          <a:xfrm>
-            <a:off x="192517" y="108761"/>
-            <a:ext cx="1480470" cy="369332"/>
-          </a:xfrm>
-          <a:prstGeom prst="rect">
-            <a:avLst/>
-          </a:prstGeom>
-          <a:noFill/>
-        </p:spPr>
-        <p:txBody>
-          <a:bodyPr wrap="none" rtlCol="0">
-            <a:spAutoFit/>
-          </a:bodyPr>
-          <a:lstStyle/>
-          <a:p>
-            <a:pPr algn="ctr"/>
-            <a:r>
-              <a:rPr lang="en-US" altLang="ko-KR" dirty="0"/>
-              <a:t>&lt; App Version</a:t>
-            </a:r>
-          </a:p>
-        </p:txBody>
-      </p:sp>
-      <p:sp>
-        <p:nvSpPr>
-          <p:cNvPr id="9" name="TextBox 8">
-            <a:extLst>
-              <a:ext uri="{FF2B5EF4-FFF2-40B4-BE49-F238E27FC236}">
-                <a16:creationId xmlns:a16="http://schemas.microsoft.com/office/drawing/2014/main" id="{D997270B-E683-B546-3A16-669298B7E848}"/>
-              </a:ext>
-            </a:extLst>
-          </p:cNvPr>
-          <p:cNvSpPr txBox="1"/>
-          <p:nvPr/>
-        </p:nvSpPr>
-        <p:spPr>
-          <a:xfrm>
-            <a:off x="709684" y="9630619"/>
-            <a:ext cx="750526" cy="369332"/>
-          </a:xfrm>
-          <a:prstGeom prst="rect">
-            <a:avLst/>
-          </a:prstGeom>
-          <a:noFill/>
-        </p:spPr>
-        <p:txBody>
-          <a:bodyPr wrap="none" rtlCol="0">
-            <a:spAutoFit/>
-          </a:bodyPr>
-          <a:lstStyle/>
-          <a:p>
-            <a:r>
-              <a:rPr lang="en-US" altLang="ko-KR" dirty="0"/>
-              <a:t>Home</a:t>
-            </a:r>
-          </a:p>
-        </p:txBody>
-      </p:sp>
-      <p:sp>
-        <p:nvSpPr>
-          <p:cNvPr id="10" name="TextBox 9">
-            <a:extLst>
-              <a:ext uri="{FF2B5EF4-FFF2-40B4-BE49-F238E27FC236}">
-                <a16:creationId xmlns:a16="http://schemas.microsoft.com/office/drawing/2014/main" id="{20C6AB76-E825-DB4E-C20C-B8E35AEA2BBC}"/>
-              </a:ext>
-            </a:extLst>
-          </p:cNvPr>
-          <p:cNvSpPr txBox="1"/>
-          <p:nvPr/>
-        </p:nvSpPr>
-        <p:spPr>
-          <a:xfrm>
-            <a:off x="2991031" y="9588409"/>
-            <a:ext cx="761619" cy="369332"/>
-          </a:xfrm>
-          <a:prstGeom prst="rect">
-            <a:avLst/>
-          </a:prstGeom>
-          <a:noFill/>
-        </p:spPr>
-        <p:txBody>
-          <a:bodyPr wrap="none" rtlCol="0">
-            <a:spAutoFit/>
-          </a:bodyPr>
-          <a:lstStyle/>
-          <a:p>
-            <a:r>
-              <a:rPr lang="en-US" altLang="ko-KR" dirty="0"/>
-              <a:t>Status</a:t>
-            </a:r>
-          </a:p>
-        </p:txBody>
-      </p:sp>
-      <p:sp>
-        <p:nvSpPr>
-          <p:cNvPr id="11" name="TextBox 10">
-            <a:extLst>
-              <a:ext uri="{FF2B5EF4-FFF2-40B4-BE49-F238E27FC236}">
-                <a16:creationId xmlns:a16="http://schemas.microsoft.com/office/drawing/2014/main" id="{46A11555-3166-4E8C-4A7B-FF2F374E612B}"/>
-              </a:ext>
-            </a:extLst>
-          </p:cNvPr>
-          <p:cNvSpPr txBox="1"/>
-          <p:nvPr/>
-        </p:nvSpPr>
-        <p:spPr>
-          <a:xfrm>
-            <a:off x="5270207" y="9576039"/>
-            <a:ext cx="839012" cy="369332"/>
-          </a:xfrm>
-          <a:prstGeom prst="rect">
-            <a:avLst/>
-          </a:prstGeom>
-          <a:noFill/>
-        </p:spPr>
-        <p:txBody>
-          <a:bodyPr wrap="none" rtlCol="0">
-            <a:spAutoFit/>
-          </a:bodyPr>
-          <a:lstStyle/>
-          <a:p>
-            <a:r>
-              <a:rPr lang="en-US" altLang="ko-KR" dirty="0"/>
-              <a:t>Setting</a:t>
-            </a:r>
-          </a:p>
-        </p:txBody>
-      </p:sp>
-      <p:sp>
-        <p:nvSpPr>
-          <p:cNvPr id="14" name="TextBox 13">
-            <a:extLst>
-              <a:ext uri="{FF2B5EF4-FFF2-40B4-BE49-F238E27FC236}">
-                <a16:creationId xmlns:a16="http://schemas.microsoft.com/office/drawing/2014/main" id="{C4206C70-B6DC-B039-8161-78D10E3AC545}"/>
-              </a:ext>
-            </a:extLst>
-          </p:cNvPr>
-          <p:cNvSpPr txBox="1"/>
-          <p:nvPr/>
-        </p:nvSpPr>
-        <p:spPr>
-          <a:xfrm>
-            <a:off x="354842" y="1009934"/>
-            <a:ext cx="2696444" cy="369332"/>
-          </a:xfrm>
-          <a:prstGeom prst="rect">
-            <a:avLst/>
-          </a:prstGeom>
-          <a:noFill/>
-        </p:spPr>
-        <p:txBody>
-          <a:bodyPr wrap="none" rtlCol="0">
-            <a:spAutoFit/>
-          </a:bodyPr>
-          <a:lstStyle/>
-          <a:p>
-            <a:r>
-              <a:rPr lang="en-US" altLang="ko-KR" dirty="0"/>
-              <a:t>Current App version : 1.0.0</a:t>
-            </a:r>
-            <a:endParaRPr lang="ko-KR" altLang="en-US" dirty="0"/>
-          </a:p>
-        </p:txBody>
-      </p:sp>
-    </p:spTree>
-    <p:extLst>
-      <p:ext uri="{BB962C8B-B14F-4D97-AF65-F5344CB8AC3E}">
-        <p14:creationId xmlns:p14="http://schemas.microsoft.com/office/powerpoint/2010/main" val="893776330"/>
-      </p:ext>
-    </p:extLst>
-  </p:cSld>
-  <p:clrMapOvr>
-    <a:masterClrMapping/>
-  </p:clrMapOvr>
-</p:sld>
-</file>
-
 <file path=ppt/slides/slide8.xml><?xml version="1.0" encoding="utf-8"?>
 <p:sld xmlns:a="http://schemas.openxmlformats.org/drawingml/2006/main" xmlns:r="http://schemas.openxmlformats.org/officeDocument/2006/relationships" xmlns:p="http://schemas.openxmlformats.org/presentationml/2006/main">
   <p:cSld>
@@ -15417,8 +16976,8 @@
         </p:nvSpPr>
         <p:spPr>
           <a:xfrm>
-            <a:off x="154367" y="132865"/>
-            <a:ext cx="1760225" cy="369332"/>
+            <a:off x="192517" y="108761"/>
+            <a:ext cx="1480470" cy="369332"/>
           </a:xfrm>
           <a:prstGeom prst="rect">
             <a:avLst/>
@@ -15434,7 +16993,7 @@
             <a:pPr algn="ctr"/>
             <a:r>
               <a:rPr lang="en-US" altLang="ko-KR" dirty="0"/>
-              <a:t>&lt; Send Feedback</a:t>
+              <a:t>&lt; App Version</a:t>
             </a:r>
           </a:p>
         </p:txBody>
@@ -15544,10 +17103,46 @@
           </a:p>
         </p:txBody>
       </p:sp>
+      <p:sp>
+        <p:nvSpPr>
+          <p:cNvPr id="14" name="TextBox 13">
+            <a:extLst>
+              <a:ext uri="{FF2B5EF4-FFF2-40B4-BE49-F238E27FC236}">
+                <a16:creationId xmlns:a16="http://schemas.microsoft.com/office/drawing/2014/main" id="{C4206C70-B6DC-B039-8161-78D10E3AC545}"/>
+              </a:ext>
+            </a:extLst>
+          </p:cNvPr>
+          <p:cNvSpPr txBox="1"/>
+          <p:nvPr/>
+        </p:nvSpPr>
+        <p:spPr>
+          <a:xfrm>
+            <a:off x="354842" y="1009934"/>
+            <a:ext cx="2696444" cy="369332"/>
+          </a:xfrm>
+          <a:prstGeom prst="rect">
+            <a:avLst/>
+          </a:prstGeom>
+          <a:noFill/>
+        </p:spPr>
+        <p:txBody>
+          <a:bodyPr wrap="none" rtlCol="0">
+            <a:spAutoFit/>
+          </a:bodyPr>
+          <a:lstStyle/>
+          <a:p>
+            <a:r>
+              <a:rPr lang="en-US" altLang="ko-KR" dirty="0"/>
+              <a:t>Current App version : 1.0.0</a:t>
+            </a:r>
+            <a:endParaRPr lang="ko-KR" altLang="en-US" dirty="0"/>
+          </a:p>
+        </p:txBody>
+      </p:sp>
     </p:spTree>
     <p:extLst>
       <p:ext uri="{BB962C8B-B14F-4D97-AF65-F5344CB8AC3E}">
-        <p14:creationId xmlns:p14="http://schemas.microsoft.com/office/powerpoint/2010/main" val="2010952974"/>
+        <p14:creationId xmlns:p14="http://schemas.microsoft.com/office/powerpoint/2010/main" val="893776330"/>
       </p:ext>
     </p:extLst>
   </p:cSld>
@@ -15776,8 +17371,8 @@
         </p:nvSpPr>
         <p:spPr>
           <a:xfrm>
-            <a:off x="154367" y="115165"/>
-            <a:ext cx="2174236" cy="646331"/>
+            <a:off x="154367" y="132865"/>
+            <a:ext cx="1760225" cy="369332"/>
           </a:xfrm>
           <a:prstGeom prst="rect">
             <a:avLst/>
@@ -15785,18 +17380,16 @@
           <a:noFill/>
         </p:spPr>
         <p:txBody>
-          <a:bodyPr wrap="square" rtlCol="0">
+          <a:bodyPr wrap="none" rtlCol="0">
             <a:spAutoFit/>
           </a:bodyPr>
           <a:lstStyle/>
           <a:p>
+            <a:pPr algn="ctr"/>
             <a:r>
               <a:rPr lang="en-US" altLang="ko-KR" dirty="0"/>
-              <a:t>&lt; Privacy Policy</a:t>
+              <a:t>&lt; Send Feedback</a:t>
             </a:r>
-          </a:p>
-          <a:p>
-            <a:endParaRPr lang="en-US" altLang="ko-KR" dirty="0"/>
           </a:p>
         </p:txBody>
       </p:sp>
@@ -15908,7 +17501,7 @@
     </p:spTree>
     <p:extLst>
       <p:ext uri="{BB962C8B-B14F-4D97-AF65-F5344CB8AC3E}">
-        <p14:creationId xmlns:p14="http://schemas.microsoft.com/office/powerpoint/2010/main" val="2727306627"/>
+        <p14:creationId xmlns:p14="http://schemas.microsoft.com/office/powerpoint/2010/main" val="2010952974"/>
       </p:ext>
     </p:extLst>
   </p:cSld>

</xml_diff>